<commit_message>
Update title slide for vslive redmond 2025
</commit_message>
<xml_diff>
--- a/2025/0806_VSLiveRedmond/VSLive MSHQ 25 - Get Started with WinUI.pptx
+++ b/2025/0806_VSLiveRedmond/VSLive MSHQ 25 - Get Started with WinUI.pptx
@@ -598,6 +598,14 @@
           <a:bodyPr/>
           <a:lstStyle/>
           <a:p>
+            <a:r>
+              <a:rPr lang="en-US" dirty="0"/>
+              <a:t>Hi folks! Welcome to my session on getting started with WinUI and Windows App SDK. Let’s get </a:t>
+            </a:r>
+            <a:r>
+              <a:rPr lang="en-US"/>
+              <a:t>right into it!</a:t>
+            </a:r>
             <a:endParaRPr lang="en-US" dirty="0"/>
           </a:p>
         </p:txBody>
@@ -2048,7 +2056,7 @@
           <a:p>
             <a:fld id="{D088F999-7A4E-6B4F-9FED-EF75B73AD044}" type="datetimeFigureOut">
               <a:rPr lang="en-US" smtClean="0"/>
-              <a:t>6/28/2025</a:t>
+              <a:t>7/20/2025</a:t>
             </a:fld>
             <a:endParaRPr lang="en-US"/>
           </a:p>
@@ -2216,7 +2224,7 @@
           <a:p>
             <a:fld id="{D088F999-7A4E-6B4F-9FED-EF75B73AD044}" type="datetimeFigureOut">
               <a:rPr lang="en-US" smtClean="0"/>
-              <a:t>6/28/2025</a:t>
+              <a:t>7/20/2025</a:t>
             </a:fld>
             <a:endParaRPr lang="en-US"/>
           </a:p>
@@ -2394,7 +2402,7 @@
           <a:p>
             <a:fld id="{D088F999-7A4E-6B4F-9FED-EF75B73AD044}" type="datetimeFigureOut">
               <a:rPr lang="en-US" smtClean="0"/>
-              <a:t>6/28/2025</a:t>
+              <a:t>7/20/2025</a:t>
             </a:fld>
             <a:endParaRPr lang="en-US"/>
           </a:p>
@@ -2563,7 +2571,7 @@
             <a:fld id="{3FE51E94-D08C-431E-88FC-7EB62E529A19}" type="datetimeFigureOut">
               <a:rPr lang="en-US" smtClean="0"/>
               <a:pPr/>
-              <a:t>6/28/2025</a:t>
+              <a:t>7/20/2025</a:t>
             </a:fld>
             <a:endParaRPr lang="en-US"/>
           </a:p>
@@ -2732,7 +2740,7 @@
           <a:p>
             <a:fld id="{D088F999-7A4E-6B4F-9FED-EF75B73AD044}" type="datetimeFigureOut">
               <a:rPr lang="en-US" smtClean="0"/>
-              <a:t>6/28/2025</a:t>
+              <a:t>7/20/2025</a:t>
             </a:fld>
             <a:endParaRPr lang="en-US"/>
           </a:p>
@@ -2977,7 +2985,7 @@
           <a:p>
             <a:fld id="{D088F999-7A4E-6B4F-9FED-EF75B73AD044}" type="datetimeFigureOut">
               <a:rPr lang="en-US" smtClean="0"/>
-              <a:t>6/28/2025</a:t>
+              <a:t>7/20/2025</a:t>
             </a:fld>
             <a:endParaRPr lang="en-US"/>
           </a:p>
@@ -3262,7 +3270,7 @@
           <a:p>
             <a:fld id="{D088F999-7A4E-6B4F-9FED-EF75B73AD044}" type="datetimeFigureOut">
               <a:rPr lang="en-US" smtClean="0"/>
-              <a:t>6/28/2025</a:t>
+              <a:t>7/20/2025</a:t>
             </a:fld>
             <a:endParaRPr lang="en-US"/>
           </a:p>
@@ -3681,7 +3689,7 @@
           <a:p>
             <a:fld id="{D088F999-7A4E-6B4F-9FED-EF75B73AD044}" type="datetimeFigureOut">
               <a:rPr lang="en-US" smtClean="0"/>
-              <a:t>6/28/2025</a:t>
+              <a:t>7/20/2025</a:t>
             </a:fld>
             <a:endParaRPr lang="en-US"/>
           </a:p>
@@ -3798,7 +3806,7 @@
           <a:p>
             <a:fld id="{D088F999-7A4E-6B4F-9FED-EF75B73AD044}" type="datetimeFigureOut">
               <a:rPr lang="en-US" smtClean="0"/>
-              <a:t>6/28/2025</a:t>
+              <a:t>7/20/2025</a:t>
             </a:fld>
             <a:endParaRPr lang="en-US"/>
           </a:p>
@@ -3893,7 +3901,7 @@
           <a:p>
             <a:fld id="{D088F999-7A4E-6B4F-9FED-EF75B73AD044}" type="datetimeFigureOut">
               <a:rPr lang="en-US" smtClean="0"/>
-              <a:t>6/28/2025</a:t>
+              <a:t>7/20/2025</a:t>
             </a:fld>
             <a:endParaRPr lang="en-US"/>
           </a:p>
@@ -4168,7 +4176,7 @@
           <a:p>
             <a:fld id="{D088F999-7A4E-6B4F-9FED-EF75B73AD044}" type="datetimeFigureOut">
               <a:rPr lang="en-US" smtClean="0"/>
-              <a:t>6/28/2025</a:t>
+              <a:t>7/20/2025</a:t>
             </a:fld>
             <a:endParaRPr lang="en-US"/>
           </a:p>
@@ -4420,7 +4428,7 @@
           <a:p>
             <a:fld id="{D088F999-7A4E-6B4F-9FED-EF75B73AD044}" type="datetimeFigureOut">
               <a:rPr lang="en-US" smtClean="0"/>
-              <a:t>6/28/2025</a:t>
+              <a:t>7/20/2025</a:t>
             </a:fld>
             <a:endParaRPr lang="en-US"/>
           </a:p>
@@ -4640,7 +4648,7 @@
           <a:p>
             <a:fld id="{D088F999-7A4E-6B4F-9FED-EF75B73AD044}" type="datetimeFigureOut">
               <a:rPr lang="en-US" smtClean="0"/>
-              <a:t>6/28/2025</a:t>
+              <a:t>7/20/2025</a:t>
             </a:fld>
             <a:endParaRPr lang="en-US"/>
           </a:p>
@@ -5157,7 +5165,7 @@
           <a:p>
             <a:fld id="{D088F999-7A4E-6B4F-9FED-EF75B73AD044}" type="datetimeFigureOut">
               <a:rPr lang="en-US" smtClean="0"/>
-              <a:t>6/28/2025</a:t>
+              <a:t>7/20/2025</a:t>
             </a:fld>
             <a:endParaRPr lang="en-US"/>
           </a:p>

</xml_diff>

<commit_message>
Update vslive ms hq slide deck
Add Windows AI API slide
</commit_message>
<xml_diff>
--- a/2025/0806_VSLiveRedmond/VSLive MSHQ 25 - Get Started with WinUI.pptx
+++ b/2025/0806_VSLiveRedmond/VSLive MSHQ 25 - Get Started with WinUI.pptx
@@ -6,10 +6,10 @@
     <p:sldMasterId id="2147483760" r:id="rId2"/>
   </p:sldMasterIdLst>
   <p:notesMasterIdLst>
-    <p:notesMasterId r:id="rId18"/>
+    <p:notesMasterId r:id="rId19"/>
   </p:notesMasterIdLst>
   <p:handoutMasterIdLst>
-    <p:handoutMasterId r:id="rId19"/>
+    <p:handoutMasterId r:id="rId20"/>
   </p:handoutMasterIdLst>
   <p:sldIdLst>
     <p:sldId id="258" r:id="rId3"/>
@@ -25,8 +25,9 @@
     <p:sldId id="272" r:id="rId13"/>
     <p:sldId id="273" r:id="rId14"/>
     <p:sldId id="274" r:id="rId15"/>
-    <p:sldId id="275" r:id="rId16"/>
-    <p:sldId id="263" r:id="rId17"/>
+    <p:sldId id="276" r:id="rId16"/>
+    <p:sldId id="275" r:id="rId17"/>
+    <p:sldId id="263" r:id="rId18"/>
   </p:sldIdLst>
   <p:sldSz cx="9144000" cy="5143500" type="screen16x9"/>
   <p:notesSz cx="6858000" cy="9144000"/>
@@ -989,6 +990,138 @@
           <a:bodyPr/>
           <a:lstStyle/>
           <a:p>
+            <a:r>
+              <a:rPr lang="en-US" dirty="0"/>
+              <a:t>Windows AI Foundry offers AI-backed features and APIs that run locally on Windows 11 PCs in the background at all times.</a:t>
+            </a:r>
+          </a:p>
+          <a:p>
+            <a:endParaRPr lang="en-US" dirty="0"/>
+          </a:p>
+          <a:p>
+            <a:r>
+              <a:rPr lang="en-US" dirty="0"/>
+              <a:t>The Windows AI APIs are part of Windows App SDK and can be developed and run on Copilot+ PCs. Some initial APIs were released in 1.7 and more are coming in 1.8.</a:t>
+            </a:r>
+          </a:p>
+          <a:p>
+            <a:endParaRPr lang="en-US" dirty="0"/>
+          </a:p>
+          <a:p>
+            <a:r>
+              <a:rPr lang="en-US" dirty="0"/>
+              <a:t>The Phi Silica model provides a local NPU-based language model for text responses. The APIs include content moderation features to prevent access to different types of sensitive information.</a:t>
+            </a:r>
+          </a:p>
+          <a:p>
+            <a:endParaRPr lang="en-US" dirty="0"/>
+          </a:p>
+          <a:p>
+            <a:r>
+              <a:rPr lang="en-US" dirty="0"/>
+              <a:t>Text recognition APIs use AI to extract text from images and return it as a character stream.</a:t>
+            </a:r>
+          </a:p>
+          <a:p>
+            <a:endParaRPr lang="en-US" dirty="0"/>
+          </a:p>
+          <a:p>
+            <a:r>
+              <a:rPr lang="en-US" dirty="0"/>
+              <a:t>There are several imaging APIs available in preview APIs:</a:t>
+            </a:r>
+          </a:p>
+          <a:p>
+            <a:pPr lvl="1"/>
+            <a:r>
+              <a:rPr lang="en-US" dirty="0"/>
+              <a:t>- Super Image Resolution provides image upscaling capabilities</a:t>
+            </a:r>
+          </a:p>
+          <a:p>
+            <a:pPr lvl="1"/>
+            <a:r>
+              <a:rPr lang="en-US" dirty="0"/>
+              <a:t>- Image Description can detect the contents of an image and provide a text description</a:t>
+            </a:r>
+          </a:p>
+          <a:p>
+            <a:pPr lvl="1"/>
+            <a:r>
+              <a:rPr lang="en-US" dirty="0"/>
+              <a:t>- Image Segmentation detects objects within an image</a:t>
+            </a:r>
+          </a:p>
+          <a:p>
+            <a:pPr lvl="1"/>
+            <a:r>
+              <a:rPr lang="en-US"/>
+              <a:t>- Object </a:t>
+            </a:r>
+            <a:r>
+              <a:rPr lang="en-US" dirty="0"/>
+              <a:t>Erase can remove objects from images</a:t>
+            </a:r>
+          </a:p>
+        </p:txBody>
+      </p:sp>
+    </p:spTree>
+    <p:extLst>
+      <p:ext uri="{BB962C8B-B14F-4D97-AF65-F5344CB8AC3E}">
+        <p14:creationId xmlns:p14="http://schemas.microsoft.com/office/powerpoint/2010/main" val="1020812582"/>
+      </p:ext>
+    </p:extLst>
+  </p:cSld>
+  <p:clrMapOvr>
+    <a:masterClrMapping/>
+  </p:clrMapOvr>
+</p:notes>
+</file>
+
+<file path=ppt/notesSlides/notesSlide14.xml><?xml version="1.0" encoding="utf-8"?>
+<p:notes xmlns:a="http://schemas.openxmlformats.org/drawingml/2006/main" xmlns:r="http://schemas.openxmlformats.org/officeDocument/2006/relationships" xmlns:p="http://schemas.openxmlformats.org/presentationml/2006/main">
+  <p:cSld>
+    <p:spTree>
+      <p:nvGrpSpPr>
+        <p:cNvPr id="1" name=""/>
+        <p:cNvGrpSpPr/>
+        <p:nvPr/>
+      </p:nvGrpSpPr>
+      <p:grpSpPr>
+        <a:xfrm>
+          <a:off x="0" y="0"/>
+          <a:ext cx="0" cy="0"/>
+          <a:chOff x="0" y="0"/>
+          <a:chExt cx="0" cy="0"/>
+        </a:xfrm>
+      </p:grpSpPr>
+      <p:sp>
+        <p:nvSpPr>
+          <p:cNvPr id="2" name="Slide Image Placeholder 1"/>
+          <p:cNvSpPr>
+            <a:spLocks noGrp="1" noRot="1" noChangeAspect="1"/>
+          </p:cNvSpPr>
+          <p:nvPr>
+            <p:ph type="sldImg"/>
+          </p:nvPr>
+        </p:nvSpPr>
+        <p:spPr/>
+      </p:sp>
+      <p:sp>
+        <p:nvSpPr>
+          <p:cNvPr id="3" name="Notes Placeholder 2"/>
+          <p:cNvSpPr>
+            <a:spLocks noGrp="1"/>
+          </p:cNvSpPr>
+          <p:nvPr>
+            <p:ph type="body" idx="1"/>
+          </p:nvPr>
+        </p:nvSpPr>
+        <p:spPr/>
+        <p:txBody>
+          <a:bodyPr/>
+          <a:lstStyle/>
+          <a:p>
             <a:pPr marL="0" marR="0" lvl="0" indent="0" algn="l" defTabSz="914400" rtl="0" eaLnBrk="1" fontAlgn="auto" latinLnBrk="0" hangingPunct="1">
               <a:lnSpc>
                 <a:spcPct val="100000"/>
@@ -1026,7 +1159,7 @@
 </p:notes>
 </file>
 
-<file path=ppt/notesSlides/notesSlide14.xml><?xml version="1.0" encoding="utf-8"?>
+<file path=ppt/notesSlides/notesSlide15.xml><?xml version="1.0" encoding="utf-8"?>
 <p:notes xmlns:a="http://schemas.openxmlformats.org/drawingml/2006/main" xmlns:r="http://schemas.openxmlformats.org/officeDocument/2006/relationships" xmlns:p="http://schemas.openxmlformats.org/presentationml/2006/main">
   <p:cSld>
     <p:spTree>
@@ -2056,7 +2189,7 @@
           <a:p>
             <a:fld id="{D088F999-7A4E-6B4F-9FED-EF75B73AD044}" type="datetimeFigureOut">
               <a:rPr lang="en-US" smtClean="0"/>
-              <a:t>7/20/2025</a:t>
+              <a:t>7/26/2025</a:t>
             </a:fld>
             <a:endParaRPr lang="en-US"/>
           </a:p>
@@ -2224,7 +2357,7 @@
           <a:p>
             <a:fld id="{D088F999-7A4E-6B4F-9FED-EF75B73AD044}" type="datetimeFigureOut">
               <a:rPr lang="en-US" smtClean="0"/>
-              <a:t>7/20/2025</a:t>
+              <a:t>7/26/2025</a:t>
             </a:fld>
             <a:endParaRPr lang="en-US"/>
           </a:p>
@@ -2402,7 +2535,7 @@
           <a:p>
             <a:fld id="{D088F999-7A4E-6B4F-9FED-EF75B73AD044}" type="datetimeFigureOut">
               <a:rPr lang="en-US" smtClean="0"/>
-              <a:t>7/20/2025</a:t>
+              <a:t>7/26/2025</a:t>
             </a:fld>
             <a:endParaRPr lang="en-US"/>
           </a:p>
@@ -2571,7 +2704,7 @@
             <a:fld id="{3FE51E94-D08C-431E-88FC-7EB62E529A19}" type="datetimeFigureOut">
               <a:rPr lang="en-US" smtClean="0"/>
               <a:pPr/>
-              <a:t>7/20/2025</a:t>
+              <a:t>7/26/2025</a:t>
             </a:fld>
             <a:endParaRPr lang="en-US"/>
           </a:p>
@@ -2740,7 +2873,7 @@
           <a:p>
             <a:fld id="{D088F999-7A4E-6B4F-9FED-EF75B73AD044}" type="datetimeFigureOut">
               <a:rPr lang="en-US" smtClean="0"/>
-              <a:t>7/20/2025</a:t>
+              <a:t>7/26/2025</a:t>
             </a:fld>
             <a:endParaRPr lang="en-US"/>
           </a:p>
@@ -2985,7 +3118,7 @@
           <a:p>
             <a:fld id="{D088F999-7A4E-6B4F-9FED-EF75B73AD044}" type="datetimeFigureOut">
               <a:rPr lang="en-US" smtClean="0"/>
-              <a:t>7/20/2025</a:t>
+              <a:t>7/26/2025</a:t>
             </a:fld>
             <a:endParaRPr lang="en-US"/>
           </a:p>
@@ -3270,7 +3403,7 @@
           <a:p>
             <a:fld id="{D088F999-7A4E-6B4F-9FED-EF75B73AD044}" type="datetimeFigureOut">
               <a:rPr lang="en-US" smtClean="0"/>
-              <a:t>7/20/2025</a:t>
+              <a:t>7/26/2025</a:t>
             </a:fld>
             <a:endParaRPr lang="en-US"/>
           </a:p>
@@ -3689,7 +3822,7 @@
           <a:p>
             <a:fld id="{D088F999-7A4E-6B4F-9FED-EF75B73AD044}" type="datetimeFigureOut">
               <a:rPr lang="en-US" smtClean="0"/>
-              <a:t>7/20/2025</a:t>
+              <a:t>7/26/2025</a:t>
             </a:fld>
             <a:endParaRPr lang="en-US"/>
           </a:p>
@@ -3806,7 +3939,7 @@
           <a:p>
             <a:fld id="{D088F999-7A4E-6B4F-9FED-EF75B73AD044}" type="datetimeFigureOut">
               <a:rPr lang="en-US" smtClean="0"/>
-              <a:t>7/20/2025</a:t>
+              <a:t>7/26/2025</a:t>
             </a:fld>
             <a:endParaRPr lang="en-US"/>
           </a:p>
@@ -3901,7 +4034,7 @@
           <a:p>
             <a:fld id="{D088F999-7A4E-6B4F-9FED-EF75B73AD044}" type="datetimeFigureOut">
               <a:rPr lang="en-US" smtClean="0"/>
-              <a:t>7/20/2025</a:t>
+              <a:t>7/26/2025</a:t>
             </a:fld>
             <a:endParaRPr lang="en-US"/>
           </a:p>
@@ -4176,7 +4309,7 @@
           <a:p>
             <a:fld id="{D088F999-7A4E-6B4F-9FED-EF75B73AD044}" type="datetimeFigureOut">
               <a:rPr lang="en-US" smtClean="0"/>
-              <a:t>7/20/2025</a:t>
+              <a:t>7/26/2025</a:t>
             </a:fld>
             <a:endParaRPr lang="en-US"/>
           </a:p>
@@ -4428,7 +4561,7 @@
           <a:p>
             <a:fld id="{D088F999-7A4E-6B4F-9FED-EF75B73AD044}" type="datetimeFigureOut">
               <a:rPr lang="en-US" smtClean="0"/>
-              <a:t>7/20/2025</a:t>
+              <a:t>7/26/2025</a:t>
             </a:fld>
             <a:endParaRPr lang="en-US"/>
           </a:p>
@@ -4648,7 +4781,7 @@
           <a:p>
             <a:fld id="{D088F999-7A4E-6B4F-9FED-EF75B73AD044}" type="datetimeFigureOut">
               <a:rPr lang="en-US" smtClean="0"/>
-              <a:t>7/20/2025</a:t>
+              <a:t>7/26/2025</a:t>
             </a:fld>
             <a:endParaRPr lang="en-US"/>
           </a:p>
@@ -5165,7 +5298,7 @@
           <a:p>
             <a:fld id="{D088F999-7A4E-6B4F-9FED-EF75B73AD044}" type="datetimeFigureOut">
               <a:rPr lang="en-US" smtClean="0"/>
-              <a:t>7/20/2025</a:t>
+              <a:t>7/26/2025</a:t>
             </a:fld>
             <a:endParaRPr lang="en-US"/>
           </a:p>
@@ -6825,6 +6958,127 @@
           <p:cNvPr id="2" name="Title 1">
             <a:extLst>
               <a:ext uri="{FF2B5EF4-FFF2-40B4-BE49-F238E27FC236}">
+                <a16:creationId xmlns:a16="http://schemas.microsoft.com/office/drawing/2014/main" id="{C9282B07-BAAB-6793-2375-415B13D5D3B6}"/>
+              </a:ext>
+            </a:extLst>
+          </p:cNvPr>
+          <p:cNvSpPr>
+            <a:spLocks noGrp="1"/>
+          </p:cNvSpPr>
+          <p:nvPr>
+            <p:ph type="title"/>
+          </p:nvPr>
+        </p:nvSpPr>
+        <p:spPr/>
+        <p:txBody>
+          <a:bodyPr>
+            <a:normAutofit fontScale="90000"/>
+          </a:bodyPr>
+          <a:lstStyle/>
+          <a:p>
+            <a:r>
+              <a:rPr lang="en-US" dirty="0"/>
+              <a:t>Windows AI APIs in Windows App SDK</a:t>
+            </a:r>
+          </a:p>
+        </p:txBody>
+      </p:sp>
+      <p:sp>
+        <p:nvSpPr>
+          <p:cNvPr id="3" name="Content Placeholder 2">
+            <a:extLst>
+              <a:ext uri="{FF2B5EF4-FFF2-40B4-BE49-F238E27FC236}">
+                <a16:creationId xmlns:a16="http://schemas.microsoft.com/office/drawing/2014/main" id="{CA064612-CC5C-EF4F-462E-1F4724A70ABB}"/>
+              </a:ext>
+            </a:extLst>
+          </p:cNvPr>
+          <p:cNvSpPr>
+            <a:spLocks noGrp="1"/>
+          </p:cNvSpPr>
+          <p:nvPr>
+            <p:ph idx="1"/>
+          </p:nvPr>
+        </p:nvSpPr>
+        <p:spPr/>
+        <p:txBody>
+          <a:bodyPr>
+            <a:normAutofit lnSpcReduction="10000"/>
+          </a:bodyPr>
+          <a:lstStyle/>
+          <a:p>
+            <a:r>
+              <a:rPr lang="en-US" dirty="0"/>
+              <a:t>Part of Windows AI Foundry</a:t>
+            </a:r>
+          </a:p>
+          <a:p>
+            <a:r>
+              <a:rPr lang="en-US" dirty="0"/>
+              <a:t>Available starting in Windows App SDK 1.7</a:t>
+            </a:r>
+          </a:p>
+          <a:p>
+            <a:r>
+              <a:rPr lang="en-US" dirty="0"/>
+              <a:t>Use local Phi Silica models on Copilot+ PCs</a:t>
+            </a:r>
+          </a:p>
+          <a:p>
+            <a:pPr lvl="1"/>
+            <a:r>
+              <a:rPr lang="en-US" dirty="0"/>
+              <a:t>Text responses w/ content moderation</a:t>
+            </a:r>
+          </a:p>
+          <a:p>
+            <a:r>
+              <a:rPr lang="en-US" dirty="0"/>
+              <a:t>Text recognition (OCR)</a:t>
+            </a:r>
+          </a:p>
+          <a:p>
+            <a:r>
+              <a:rPr lang="en-US" dirty="0"/>
+              <a:t>Imaging</a:t>
+            </a:r>
+          </a:p>
+        </p:txBody>
+      </p:sp>
+    </p:spTree>
+    <p:extLst>
+      <p:ext uri="{BB962C8B-B14F-4D97-AF65-F5344CB8AC3E}">
+        <p14:creationId xmlns:p14="http://schemas.microsoft.com/office/powerpoint/2010/main" val="2035598588"/>
+      </p:ext>
+    </p:extLst>
+  </p:cSld>
+  <p:clrMapOvr>
+    <a:masterClrMapping/>
+  </p:clrMapOvr>
+</p:sld>
+</file>
+
+<file path=ppt/slides/slide15.xml><?xml version="1.0" encoding="utf-8"?>
+<p:sld xmlns:a="http://schemas.openxmlformats.org/drawingml/2006/main" xmlns:r="http://schemas.openxmlformats.org/officeDocument/2006/relationships" xmlns:p="http://schemas.openxmlformats.org/presentationml/2006/main">
+  <p:cSld>
+    <p:spTree>
+      <p:nvGrpSpPr>
+        <p:cNvPr id="1" name=""/>
+        <p:cNvGrpSpPr/>
+        <p:nvPr/>
+      </p:nvGrpSpPr>
+      <p:grpSpPr>
+        <a:xfrm>
+          <a:off x="0" y="0"/>
+          <a:ext cx="0" cy="0"/>
+          <a:chOff x="0" y="0"/>
+          <a:chExt cx="0" cy="0"/>
+        </a:xfrm>
+      </p:grpSpPr>
+      <p:sp>
+        <p:nvSpPr>
+          <p:cNvPr id="2" name="Title 1">
+            <a:extLst>
+              <a:ext uri="{FF2B5EF4-FFF2-40B4-BE49-F238E27FC236}">
                 <a16:creationId xmlns:a16="http://schemas.microsoft.com/office/drawing/2014/main" id="{FABFF942-0183-67D3-798F-F6797D6CB900}"/>
               </a:ext>
             </a:extLst>
@@ -6956,7 +7210,7 @@
 </p:sld>
 </file>
 
-<file path=ppt/slides/slide15.xml><?xml version="1.0" encoding="utf-8"?>
+<file path=ppt/slides/slide16.xml><?xml version="1.0" encoding="utf-8"?>
 <p:sld xmlns:a="http://schemas.openxmlformats.org/drawingml/2006/main" xmlns:r="http://schemas.openxmlformats.org/officeDocument/2006/relationships" xmlns:p="http://schemas.openxmlformats.org/presentationml/2006/main">
   <p:cSld>
     <p:bg>
@@ -7534,19 +7788,13 @@
           <a:p>
             <a:r>
               <a:rPr lang="en-US" dirty="0"/>
-              <a:t>Overview of WinUI 3 &amp; Windows App SDK</a:t>
-            </a:r>
-          </a:p>
-          <a:p>
-            <a:r>
-              <a:rPr lang="en-US" dirty="0"/>
-              <a:t>Creating a new WinUI 3 project</a:t>
-            </a:r>
-          </a:p>
-          <a:p>
-            <a:r>
-              <a:rPr lang="en-US" dirty="0"/>
-              <a:t>Working with controls &amp; styles</a:t>
+              <a:t>Overview of WinUI &amp; Windows App SDK</a:t>
+            </a:r>
+          </a:p>
+          <a:p>
+            <a:r>
+              <a:rPr lang="en-US" dirty="0"/>
+              <a:t>Creating a new WinUI project &amp; working with controls &amp; styles</a:t>
             </a:r>
           </a:p>
           <a:p>
@@ -7578,7 +7826,7 @@
           <a:p>
             <a:r>
               <a:rPr lang="en-US" dirty="0"/>
-              <a:t>Interop options – XAML Islands and WebView 2</a:t>
+              <a:t>Interop options – XAML Islands and WebView2</a:t>
             </a:r>
           </a:p>
           <a:p>
@@ -7596,7 +7844,13 @@
           <a:p>
             <a:r>
               <a:rPr lang="en-US" dirty="0"/>
-              <a:t>WinUI 3 roadmap</a:t>
+              <a:t>WinUI &amp; Windows App SDK roadmaps</a:t>
+            </a:r>
+          </a:p>
+          <a:p>
+            <a:r>
+              <a:rPr lang="en-US" dirty="0"/>
+              <a:t>Windows AI APIs (BONUS – time permitting)</a:t>
             </a:r>
           </a:p>
         </p:txBody>

</xml_diff>

<commit_message>
Add VS slide to vslive mshq25 deck
</commit_message>
<xml_diff>
--- a/2025/0806_VSLiveRedmond/VSLive MSHQ 25 - Get Started with WinUI.pptx
+++ b/2025/0806_VSLiveRedmond/VSLive MSHQ 25 - Get Started with WinUI.pptx
@@ -6,10 +6,10 @@
     <p:sldMasterId id="2147483760" r:id="rId2"/>
   </p:sldMasterIdLst>
   <p:notesMasterIdLst>
-    <p:notesMasterId r:id="rId19"/>
+    <p:notesMasterId r:id="rId20"/>
   </p:notesMasterIdLst>
   <p:handoutMasterIdLst>
-    <p:handoutMasterId r:id="rId20"/>
+    <p:handoutMasterId r:id="rId21"/>
   </p:handoutMasterIdLst>
   <p:sldIdLst>
     <p:sldId id="258" r:id="rId3"/>
@@ -27,7 +27,8 @@
     <p:sldId id="274" r:id="rId15"/>
     <p:sldId id="276" r:id="rId16"/>
     <p:sldId id="275" r:id="rId17"/>
-    <p:sldId id="263" r:id="rId18"/>
+    <p:sldId id="727" r:id="rId18"/>
+    <p:sldId id="263" r:id="rId19"/>
   </p:sldIdLst>
   <p:sldSz cx="9144000" cy="5143500" type="screen16x9"/>
   <p:notesSz cx="6858000" cy="9144000"/>
@@ -1164,6 +1165,107 @@
   <p:cSld>
     <p:spTree>
       <p:nvGrpSpPr>
+        <p:cNvPr id="1" name="">
+          <a:extLst>
+            <a:ext uri="{FF2B5EF4-FFF2-40B4-BE49-F238E27FC236}">
+              <a16:creationId xmlns:a16="http://schemas.microsoft.com/office/drawing/2014/main" id="{9E95234D-ED2E-1AC9-77FD-B4E379D97448}"/>
+            </a:ext>
+          </a:extLst>
+        </p:cNvPr>
+        <p:cNvGrpSpPr/>
+        <p:nvPr/>
+      </p:nvGrpSpPr>
+      <p:grpSpPr>
+        <a:xfrm>
+          <a:off x="0" y="0"/>
+          <a:ext cx="0" cy="0"/>
+          <a:chOff x="0" y="0"/>
+          <a:chExt cx="0" cy="0"/>
+        </a:xfrm>
+      </p:grpSpPr>
+      <p:sp>
+        <p:nvSpPr>
+          <p:cNvPr id="2" name="Slide Image Placeholder 1">
+            <a:extLst>
+              <a:ext uri="{FF2B5EF4-FFF2-40B4-BE49-F238E27FC236}">
+                <a16:creationId xmlns:a16="http://schemas.microsoft.com/office/drawing/2014/main" id="{5485217E-661F-F661-1D26-AD48A09E4311}"/>
+              </a:ext>
+            </a:extLst>
+          </p:cNvPr>
+          <p:cNvSpPr>
+            <a:spLocks noGrp="1" noRot="1" noChangeAspect="1"/>
+          </p:cNvSpPr>
+          <p:nvPr>
+            <p:ph type="sldImg"/>
+          </p:nvPr>
+        </p:nvSpPr>
+        <p:spPr>
+          <a:xfrm>
+            <a:off x="-458788" y="3048000"/>
+            <a:ext cx="14633576" cy="8231188"/>
+          </a:xfrm>
+          <a:prstGeom prst="rect">
+            <a:avLst/>
+          </a:prstGeom>
+          <a:noFill/>
+          <a:ln w="12700">
+            <a:solidFill>
+              <a:prstClr val="black"/>
+            </a:solidFill>
+          </a:ln>
+        </p:spPr>
+      </p:sp>
+      <p:sp>
+        <p:nvSpPr>
+          <p:cNvPr id="3" name="Notes Placeholder 2">
+            <a:extLst>
+              <a:ext uri="{FF2B5EF4-FFF2-40B4-BE49-F238E27FC236}">
+                <a16:creationId xmlns:a16="http://schemas.microsoft.com/office/drawing/2014/main" id="{DD4BF146-96FE-BF75-A0DE-2E5F0BC62C5D}"/>
+              </a:ext>
+            </a:extLst>
+          </p:cNvPr>
+          <p:cNvSpPr>
+            <a:spLocks noGrp="1"/>
+          </p:cNvSpPr>
+          <p:nvPr>
+            <p:ph type="body" idx="1"/>
+          </p:nvPr>
+        </p:nvSpPr>
+        <p:spPr>
+          <a:xfrm>
+            <a:off x="1371600" y="11736388"/>
+            <a:ext cx="10972800" cy="9602787"/>
+          </a:xfrm>
+          <a:prstGeom prst="rect">
+            <a:avLst/>
+          </a:prstGeom>
+        </p:spPr>
+        <p:txBody>
+          <a:bodyPr/>
+          <a:lstStyle/>
+          <a:p>
+            <a:endParaRPr lang="en-US"/>
+          </a:p>
+        </p:txBody>
+      </p:sp>
+    </p:spTree>
+    <p:extLst>
+      <p:ext uri="{BB962C8B-B14F-4D97-AF65-F5344CB8AC3E}">
+        <p14:creationId xmlns:p14="http://schemas.microsoft.com/office/powerpoint/2010/main" val="2287009074"/>
+      </p:ext>
+    </p:extLst>
+  </p:cSld>
+  <p:clrMapOvr>
+    <a:masterClrMapping/>
+  </p:clrMapOvr>
+</p:notes>
+</file>
+
+<file path=ppt/notesSlides/notesSlide16.xml><?xml version="1.0" encoding="utf-8"?>
+<p:notes xmlns:a="http://schemas.openxmlformats.org/drawingml/2006/main" xmlns:r="http://schemas.openxmlformats.org/officeDocument/2006/relationships" xmlns:p="http://schemas.openxmlformats.org/presentationml/2006/main">
+  <p:cSld>
+    <p:spTree>
+      <p:nvGrpSpPr>
         <p:cNvPr id="1" name=""/>
         <p:cNvGrpSpPr/>
         <p:nvPr/>
@@ -2189,7 +2291,7 @@
           <a:p>
             <a:fld id="{D088F999-7A4E-6B4F-9FED-EF75B73AD044}" type="datetimeFigureOut">
               <a:rPr lang="en-US" smtClean="0"/>
-              <a:t>7/26/2025</a:t>
+              <a:t>7/29/2025</a:t>
             </a:fld>
             <a:endParaRPr lang="en-US"/>
           </a:p>
@@ -2357,7 +2459,7 @@
           <a:p>
             <a:fld id="{D088F999-7A4E-6B4F-9FED-EF75B73AD044}" type="datetimeFigureOut">
               <a:rPr lang="en-US" smtClean="0"/>
-              <a:t>7/26/2025</a:t>
+              <a:t>7/29/2025</a:t>
             </a:fld>
             <a:endParaRPr lang="en-US"/>
           </a:p>
@@ -2535,7 +2637,7 @@
           <a:p>
             <a:fld id="{D088F999-7A4E-6B4F-9FED-EF75B73AD044}" type="datetimeFigureOut">
               <a:rPr lang="en-US" smtClean="0"/>
-              <a:t>7/26/2025</a:t>
+              <a:t>7/29/2025</a:t>
             </a:fld>
             <a:endParaRPr lang="en-US"/>
           </a:p>
@@ -2597,6 +2699,661 @@
 </file>
 
 <file path=ppt/slideLayouts/slideLayout12.xml><?xml version="1.0" encoding="utf-8"?>
+<p:sldLayout xmlns:a="http://schemas.openxmlformats.org/drawingml/2006/main" xmlns:r="http://schemas.openxmlformats.org/officeDocument/2006/relationships" xmlns:p="http://schemas.openxmlformats.org/presentationml/2006/main" userDrawn="1">
+  <p:cSld name="3 points">
+    <p:spTree>
+      <p:nvGrpSpPr>
+        <p:cNvPr id="1" name=""/>
+        <p:cNvGrpSpPr/>
+        <p:nvPr/>
+      </p:nvGrpSpPr>
+      <p:grpSpPr>
+        <a:xfrm>
+          <a:off x="0" y="0"/>
+          <a:ext cx="0" cy="0"/>
+          <a:chOff x="0" y="0"/>
+          <a:chExt cx="0" cy="0"/>
+        </a:xfrm>
+      </p:grpSpPr>
+      <p:sp>
+        <p:nvSpPr>
+          <p:cNvPr id="13" name="Text Placeholder 19">
+            <a:extLst>
+              <a:ext uri="{FF2B5EF4-FFF2-40B4-BE49-F238E27FC236}">
+                <a16:creationId xmlns:a16="http://schemas.microsoft.com/office/drawing/2014/main" id="{C6DE723B-B28B-EBC1-6E40-64BC10424C1F}"/>
+              </a:ext>
+            </a:extLst>
+          </p:cNvPr>
+          <p:cNvSpPr>
+            <a:spLocks noGrp="1"/>
+          </p:cNvSpPr>
+          <p:nvPr>
+            <p:ph type="body" sz="quarter" idx="13" hasCustomPrompt="1"/>
+          </p:nvPr>
+        </p:nvSpPr>
+        <p:spPr>
+          <a:xfrm>
+            <a:off x="406263" y="413717"/>
+            <a:ext cx="2628558" cy="238125"/>
+          </a:xfrm>
+          <a:prstGeom prst="rect">
+            <a:avLst/>
+          </a:prstGeom>
+        </p:spPr>
+        <p:txBody>
+          <a:bodyPr/>
+          <a:lstStyle>
+            <a:lvl1pPr marL="0" indent="0" algn="l" defTabSz="342900" rtl="0" eaLnBrk="1" latinLnBrk="0" hangingPunct="1">
+              <a:lnSpc>
+                <a:spcPts val="1650"/>
+              </a:lnSpc>
+              <a:buNone/>
+              <a:defRPr lang="en-US" sz="1350" kern="0" spc="-27" dirty="0" smtClean="0">
+                <a:solidFill>
+                  <a:schemeClr val="bg2"/>
+                </a:solidFill>
+                <a:latin typeface="Segoe UI Variable Display Semibold" pitchFamily="34" charset="0"/>
+                <a:ea typeface="Segoe UI Variable Display Semibold" pitchFamily="34" charset="-122"/>
+                <a:cs typeface="Segoe UI Variable Display Semibold" pitchFamily="34" charset="-120"/>
+              </a:defRPr>
+            </a:lvl1pPr>
+          </a:lstStyle>
+          <a:p>
+            <a:pPr marL="0" indent="0" algn="l">
+              <a:lnSpc>
+                <a:spcPts val="4400"/>
+              </a:lnSpc>
+              <a:buNone/>
+            </a:pPr>
+            <a:r>
+              <a:rPr lang="en-US" sz="1350" kern="0" spc="-27">
+                <a:solidFill>
+                  <a:schemeClr val="bg2"/>
+                </a:solidFill>
+                <a:latin typeface="Segoe UI Variable Display Semibold" pitchFamily="34" charset="0"/>
+                <a:ea typeface="Segoe UI Variable Display Semibold" pitchFamily="34" charset="-122"/>
+                <a:cs typeface="Segoe UI Variable Display Semibold" pitchFamily="34" charset="-120"/>
+              </a:rPr>
+              <a:t>Subtitle</a:t>
+            </a:r>
+            <a:endParaRPr lang="en-US" sz="1350">
+              <a:solidFill>
+                <a:schemeClr val="bg2"/>
+              </a:solidFill>
+            </a:endParaRPr>
+          </a:p>
+        </p:txBody>
+      </p:sp>
+      <p:sp>
+        <p:nvSpPr>
+          <p:cNvPr id="14" name="Text Placeholder 19">
+            <a:extLst>
+              <a:ext uri="{FF2B5EF4-FFF2-40B4-BE49-F238E27FC236}">
+                <a16:creationId xmlns:a16="http://schemas.microsoft.com/office/drawing/2014/main" id="{7C53C2B9-339B-B9CA-D594-88D254F8055D}"/>
+              </a:ext>
+            </a:extLst>
+          </p:cNvPr>
+          <p:cNvSpPr>
+            <a:spLocks noGrp="1"/>
+          </p:cNvSpPr>
+          <p:nvPr>
+            <p:ph type="body" sz="quarter" idx="15" hasCustomPrompt="1"/>
+          </p:nvPr>
+        </p:nvSpPr>
+        <p:spPr>
+          <a:xfrm>
+            <a:off x="406263" y="622438"/>
+            <a:ext cx="2628558" cy="238125"/>
+          </a:xfrm>
+          <a:prstGeom prst="rect">
+            <a:avLst/>
+          </a:prstGeom>
+        </p:spPr>
+        <p:txBody>
+          <a:bodyPr/>
+          <a:lstStyle>
+            <a:lvl1pPr marL="0" indent="0" algn="l" defTabSz="342900" rtl="0" eaLnBrk="1" latinLnBrk="0" hangingPunct="1">
+              <a:lnSpc>
+                <a:spcPts val="1650"/>
+              </a:lnSpc>
+              <a:buNone/>
+              <a:defRPr lang="en-US" sz="1350" kern="0" spc="-27" dirty="0" smtClean="0">
+                <a:solidFill>
+                  <a:schemeClr val="bg1"/>
+                </a:solidFill>
+                <a:latin typeface="Segoe UI Variable Display Semibold" pitchFamily="34" charset="0"/>
+                <a:ea typeface="Segoe UI Variable Display Semibold" pitchFamily="34" charset="-122"/>
+                <a:cs typeface="Segoe UI Variable Display Semibold" pitchFamily="34" charset="-120"/>
+              </a:defRPr>
+            </a:lvl1pPr>
+          </a:lstStyle>
+          <a:p>
+            <a:pPr lvl="0"/>
+            <a:r>
+              <a:rPr lang="en-US"/>
+              <a:t>Title</a:t>
+            </a:r>
+          </a:p>
+        </p:txBody>
+      </p:sp>
+      <p:sp>
+        <p:nvSpPr>
+          <p:cNvPr id="2" name="Text Placeholder 19">
+            <a:extLst>
+              <a:ext uri="{FF2B5EF4-FFF2-40B4-BE49-F238E27FC236}">
+                <a16:creationId xmlns:a16="http://schemas.microsoft.com/office/drawing/2014/main" id="{8043316E-25FB-DE88-AD4F-20F98B3B997A}"/>
+              </a:ext>
+            </a:extLst>
+          </p:cNvPr>
+          <p:cNvSpPr>
+            <a:spLocks noGrp="1"/>
+          </p:cNvSpPr>
+          <p:nvPr>
+            <p:ph type="body" sz="quarter" idx="16" hasCustomPrompt="1"/>
+          </p:nvPr>
+        </p:nvSpPr>
+        <p:spPr>
+          <a:xfrm>
+            <a:off x="401221" y="2187488"/>
+            <a:ext cx="2628558" cy="238125"/>
+          </a:xfrm>
+          <a:prstGeom prst="rect">
+            <a:avLst/>
+          </a:prstGeom>
+        </p:spPr>
+        <p:txBody>
+          <a:bodyPr/>
+          <a:lstStyle>
+            <a:lvl1pPr marL="0" indent="0" algn="l" defTabSz="342900" rtl="0" eaLnBrk="1" latinLnBrk="0" hangingPunct="1">
+              <a:lnSpc>
+                <a:spcPts val="1650"/>
+              </a:lnSpc>
+              <a:buNone/>
+              <a:defRPr lang="en-US" sz="1350" kern="0" spc="-27" dirty="0" smtClean="0">
+                <a:solidFill>
+                  <a:schemeClr val="bg1"/>
+                </a:solidFill>
+                <a:latin typeface="Segoe UI Variable Display Semibold" pitchFamily="34" charset="0"/>
+                <a:ea typeface="Segoe UI Variable Display Semibold" pitchFamily="34" charset="-122"/>
+                <a:cs typeface="Segoe UI Variable Display Semibold" pitchFamily="34" charset="-120"/>
+              </a:defRPr>
+            </a:lvl1pPr>
+          </a:lstStyle>
+          <a:p>
+            <a:pPr lvl="0"/>
+            <a:r>
+              <a:rPr lang="en-US"/>
+              <a:t>Title</a:t>
+            </a:r>
+          </a:p>
+        </p:txBody>
+      </p:sp>
+      <p:sp>
+        <p:nvSpPr>
+          <p:cNvPr id="3" name="Text Placeholder 19">
+            <a:extLst>
+              <a:ext uri="{FF2B5EF4-FFF2-40B4-BE49-F238E27FC236}">
+                <a16:creationId xmlns:a16="http://schemas.microsoft.com/office/drawing/2014/main" id="{D456C768-C982-33C6-7C49-D561398248C1}"/>
+              </a:ext>
+            </a:extLst>
+          </p:cNvPr>
+          <p:cNvSpPr>
+            <a:spLocks noGrp="1"/>
+          </p:cNvSpPr>
+          <p:nvPr>
+            <p:ph type="body" sz="quarter" idx="19" hasCustomPrompt="1"/>
+          </p:nvPr>
+        </p:nvSpPr>
+        <p:spPr>
+          <a:xfrm>
+            <a:off x="401221" y="1878815"/>
+            <a:ext cx="2628558" cy="238125"/>
+          </a:xfrm>
+          <a:prstGeom prst="rect">
+            <a:avLst/>
+          </a:prstGeom>
+        </p:spPr>
+        <p:txBody>
+          <a:bodyPr/>
+          <a:lstStyle>
+            <a:lvl1pPr marL="0" indent="0" algn="l" defTabSz="342900" rtl="0" eaLnBrk="1" latinLnBrk="0" hangingPunct="1">
+              <a:lnSpc>
+                <a:spcPts val="1650"/>
+              </a:lnSpc>
+              <a:buNone/>
+              <a:defRPr lang="en-US" sz="2325" b="1" i="0" kern="1200" dirty="0" smtClean="0">
+                <a:solidFill>
+                  <a:schemeClr val="accent5"/>
+                </a:solidFill>
+                <a:latin typeface="Segoe UI Variable Display Semibold" pitchFamily="2" charset="0"/>
+                <a:ea typeface="Segoe UI Variable Semibold Display" pitchFamily="34" charset="-122"/>
+                <a:cs typeface="Segoe UI Variable Display Semibold" pitchFamily="2" charset="0"/>
+              </a:defRPr>
+            </a:lvl1pPr>
+          </a:lstStyle>
+          <a:p>
+            <a:pPr lvl="0"/>
+            <a:r>
+              <a:rPr lang="en-US"/>
+              <a:t>01</a:t>
+            </a:r>
+          </a:p>
+        </p:txBody>
+      </p:sp>
+      <p:sp>
+        <p:nvSpPr>
+          <p:cNvPr id="15" name="Text Placeholder 19">
+            <a:extLst>
+              <a:ext uri="{FF2B5EF4-FFF2-40B4-BE49-F238E27FC236}">
+                <a16:creationId xmlns:a16="http://schemas.microsoft.com/office/drawing/2014/main" id="{1B974D2C-78C7-F41F-50A2-1A7B942FDBC6}"/>
+              </a:ext>
+            </a:extLst>
+          </p:cNvPr>
+          <p:cNvSpPr>
+            <a:spLocks noGrp="1"/>
+          </p:cNvSpPr>
+          <p:nvPr>
+            <p:ph type="body" sz="quarter" idx="22" hasCustomPrompt="1"/>
+          </p:nvPr>
+        </p:nvSpPr>
+        <p:spPr>
+          <a:xfrm>
+            <a:off x="401221" y="2493293"/>
+            <a:ext cx="2628558" cy="688721"/>
+          </a:xfrm>
+          <a:prstGeom prst="rect">
+            <a:avLst/>
+          </a:prstGeom>
+        </p:spPr>
+        <p:txBody>
+          <a:bodyPr/>
+          <a:lstStyle>
+            <a:lvl1pPr marL="0" marR="0" indent="0" algn="l" defTabSz="342900" rtl="0" eaLnBrk="1" fontAlgn="auto" latinLnBrk="0" hangingPunct="1">
+              <a:lnSpc>
+                <a:spcPts val="1050"/>
+              </a:lnSpc>
+              <a:spcBef>
+                <a:spcPct val="20000"/>
+              </a:spcBef>
+              <a:spcAft>
+                <a:spcPts val="0"/>
+              </a:spcAft>
+              <a:buClrTx/>
+              <a:buSzTx/>
+              <a:buFont typeface="Arial" pitchFamily="34" charset="0"/>
+              <a:buNone/>
+              <a:tabLst/>
+              <a:defRPr lang="en-US" sz="825" kern="1200" dirty="0" smtClean="0">
+                <a:solidFill>
+                  <a:schemeClr val="bg1"/>
+                </a:solidFill>
+                <a:latin typeface="Segoe UI Variable Text Semibold" pitchFamily="34" charset="0"/>
+                <a:ea typeface="Segoe UI Variable Text Semibold" pitchFamily="34" charset="-122"/>
+                <a:cs typeface="Segoe UI Variable Text Semibold" pitchFamily="34" charset="-120"/>
+              </a:defRPr>
+            </a:lvl1pPr>
+          </a:lstStyle>
+          <a:p>
+            <a:r>
+              <a:rPr lang="en-US" sz="750" b="0"/>
+              <a:t>Baking security and trust into the development process ensures that all AI-driven tools and applications are built with security measures integrated from the beginning, protecting both the developers and the end-users.</a:t>
+            </a:r>
+            <a:endParaRPr lang="en-US" sz="750" b="1">
+              <a:latin typeface="Segoe UI Variable Text Semibold" pitchFamily="2" charset="0"/>
+            </a:endParaRPr>
+          </a:p>
+        </p:txBody>
+      </p:sp>
+      <p:sp>
+        <p:nvSpPr>
+          <p:cNvPr id="16" name="Text Placeholder 19">
+            <a:extLst>
+              <a:ext uri="{FF2B5EF4-FFF2-40B4-BE49-F238E27FC236}">
+                <a16:creationId xmlns:a16="http://schemas.microsoft.com/office/drawing/2014/main" id="{9883040D-98E9-F2A7-257B-F14720A80387}"/>
+              </a:ext>
+            </a:extLst>
+          </p:cNvPr>
+          <p:cNvSpPr>
+            <a:spLocks noGrp="1"/>
+          </p:cNvSpPr>
+          <p:nvPr>
+            <p:ph type="body" sz="quarter" idx="23" hasCustomPrompt="1"/>
+          </p:nvPr>
+        </p:nvSpPr>
+        <p:spPr>
+          <a:xfrm>
+            <a:off x="3189275" y="2187488"/>
+            <a:ext cx="2628558" cy="238125"/>
+          </a:xfrm>
+          <a:prstGeom prst="rect">
+            <a:avLst/>
+          </a:prstGeom>
+        </p:spPr>
+        <p:txBody>
+          <a:bodyPr/>
+          <a:lstStyle>
+            <a:lvl1pPr marL="0" indent="0" algn="l" defTabSz="342900" rtl="0" eaLnBrk="1" latinLnBrk="0" hangingPunct="1">
+              <a:lnSpc>
+                <a:spcPts val="1650"/>
+              </a:lnSpc>
+              <a:buNone/>
+              <a:defRPr lang="en-US" sz="1350" kern="0" spc="-27" dirty="0" smtClean="0">
+                <a:solidFill>
+                  <a:schemeClr val="bg1"/>
+                </a:solidFill>
+                <a:latin typeface="Segoe UI Variable Display Semibold" pitchFamily="34" charset="0"/>
+                <a:ea typeface="Segoe UI Variable Display Semibold" pitchFamily="34" charset="-122"/>
+                <a:cs typeface="Segoe UI Variable Display Semibold" pitchFamily="34" charset="-120"/>
+              </a:defRPr>
+            </a:lvl1pPr>
+          </a:lstStyle>
+          <a:p>
+            <a:pPr lvl="0"/>
+            <a:r>
+              <a:rPr lang="en-US"/>
+              <a:t>Title</a:t>
+            </a:r>
+          </a:p>
+        </p:txBody>
+      </p:sp>
+      <p:sp>
+        <p:nvSpPr>
+          <p:cNvPr id="17" name="Text Placeholder 19">
+            <a:extLst>
+              <a:ext uri="{FF2B5EF4-FFF2-40B4-BE49-F238E27FC236}">
+                <a16:creationId xmlns:a16="http://schemas.microsoft.com/office/drawing/2014/main" id="{AE7DEE54-3A47-CB75-F874-A91FD60BB0DB}"/>
+              </a:ext>
+            </a:extLst>
+          </p:cNvPr>
+          <p:cNvSpPr>
+            <a:spLocks noGrp="1"/>
+          </p:cNvSpPr>
+          <p:nvPr>
+            <p:ph type="body" sz="quarter" idx="24" hasCustomPrompt="1"/>
+          </p:nvPr>
+        </p:nvSpPr>
+        <p:spPr>
+          <a:xfrm>
+            <a:off x="3189275" y="1878815"/>
+            <a:ext cx="2628558" cy="238125"/>
+          </a:xfrm>
+          <a:prstGeom prst="rect">
+            <a:avLst/>
+          </a:prstGeom>
+        </p:spPr>
+        <p:txBody>
+          <a:bodyPr/>
+          <a:lstStyle>
+            <a:lvl1pPr marL="0" indent="0" algn="l" defTabSz="342900" rtl="0" eaLnBrk="1" latinLnBrk="0" hangingPunct="1">
+              <a:lnSpc>
+                <a:spcPts val="1650"/>
+              </a:lnSpc>
+              <a:buNone/>
+              <a:defRPr lang="en-US" sz="2325" b="1" i="0" kern="1200" dirty="0" smtClean="0">
+                <a:solidFill>
+                  <a:schemeClr val="accent5"/>
+                </a:solidFill>
+                <a:latin typeface="Segoe UI Variable Display Semibold" pitchFamily="2" charset="0"/>
+                <a:ea typeface="Segoe UI Variable Semibold Display" pitchFamily="34" charset="-122"/>
+                <a:cs typeface="Segoe UI Variable Display Semibold" pitchFamily="2" charset="0"/>
+              </a:defRPr>
+            </a:lvl1pPr>
+          </a:lstStyle>
+          <a:p>
+            <a:pPr lvl="0"/>
+            <a:r>
+              <a:rPr lang="en-US"/>
+              <a:t>02</a:t>
+            </a:r>
+          </a:p>
+        </p:txBody>
+      </p:sp>
+      <p:sp>
+        <p:nvSpPr>
+          <p:cNvPr id="18" name="Text Placeholder 19">
+            <a:extLst>
+              <a:ext uri="{FF2B5EF4-FFF2-40B4-BE49-F238E27FC236}">
+                <a16:creationId xmlns:a16="http://schemas.microsoft.com/office/drawing/2014/main" id="{26F0B1DE-112E-38F1-6C3B-F0F2C61D4AAD}"/>
+              </a:ext>
+            </a:extLst>
+          </p:cNvPr>
+          <p:cNvSpPr>
+            <a:spLocks noGrp="1"/>
+          </p:cNvSpPr>
+          <p:nvPr>
+            <p:ph type="body" sz="quarter" idx="25" hasCustomPrompt="1"/>
+          </p:nvPr>
+        </p:nvSpPr>
+        <p:spPr>
+          <a:xfrm>
+            <a:off x="3189275" y="2493293"/>
+            <a:ext cx="2628558" cy="688721"/>
+          </a:xfrm>
+          <a:prstGeom prst="rect">
+            <a:avLst/>
+          </a:prstGeom>
+        </p:spPr>
+        <p:txBody>
+          <a:bodyPr/>
+          <a:lstStyle>
+            <a:lvl1pPr marL="0" marR="0" indent="0" algn="l" defTabSz="342900" rtl="0" eaLnBrk="1" fontAlgn="auto" latinLnBrk="0" hangingPunct="1">
+              <a:lnSpc>
+                <a:spcPts val="1050"/>
+              </a:lnSpc>
+              <a:spcBef>
+                <a:spcPct val="20000"/>
+              </a:spcBef>
+              <a:spcAft>
+                <a:spcPts val="0"/>
+              </a:spcAft>
+              <a:buClrTx/>
+              <a:buSzTx/>
+              <a:buFont typeface="Arial" pitchFamily="34" charset="0"/>
+              <a:buNone/>
+              <a:tabLst/>
+              <a:defRPr lang="en-US" sz="825" kern="1200" dirty="0" smtClean="0">
+                <a:solidFill>
+                  <a:schemeClr val="bg1"/>
+                </a:solidFill>
+                <a:latin typeface="Segoe UI Variable Text Semibold" pitchFamily="34" charset="0"/>
+                <a:ea typeface="Segoe UI Variable Text Semibold" pitchFamily="34" charset="-122"/>
+                <a:cs typeface="Segoe UI Variable Text Semibold" pitchFamily="34" charset="-120"/>
+              </a:defRPr>
+            </a:lvl1pPr>
+          </a:lstStyle>
+          <a:p>
+            <a:r>
+              <a:rPr lang="en-US" sz="750" b="0"/>
+              <a:t>Baking security and trust into the development process ensures that all AI-driven tools and applications are built with security measures integrated from the beginning, protecting both the developers and the end-users.</a:t>
+            </a:r>
+            <a:endParaRPr lang="en-US" sz="750" b="1">
+              <a:latin typeface="Segoe UI Variable Text Semibold" pitchFamily="2" charset="0"/>
+            </a:endParaRPr>
+          </a:p>
+        </p:txBody>
+      </p:sp>
+      <p:sp>
+        <p:nvSpPr>
+          <p:cNvPr id="19" name="Text Placeholder 19">
+            <a:extLst>
+              <a:ext uri="{FF2B5EF4-FFF2-40B4-BE49-F238E27FC236}">
+                <a16:creationId xmlns:a16="http://schemas.microsoft.com/office/drawing/2014/main" id="{5E392566-4156-546D-8627-009FDB5AE192}"/>
+              </a:ext>
+            </a:extLst>
+          </p:cNvPr>
+          <p:cNvSpPr>
+            <a:spLocks noGrp="1"/>
+          </p:cNvSpPr>
+          <p:nvPr>
+            <p:ph type="body" sz="quarter" idx="26" hasCustomPrompt="1"/>
+          </p:nvPr>
+        </p:nvSpPr>
+        <p:spPr>
+          <a:xfrm>
+            <a:off x="5977330" y="2187488"/>
+            <a:ext cx="2628558" cy="238125"/>
+          </a:xfrm>
+          <a:prstGeom prst="rect">
+            <a:avLst/>
+          </a:prstGeom>
+        </p:spPr>
+        <p:txBody>
+          <a:bodyPr/>
+          <a:lstStyle>
+            <a:lvl1pPr marL="0" indent="0" algn="l" defTabSz="342900" rtl="0" eaLnBrk="1" latinLnBrk="0" hangingPunct="1">
+              <a:lnSpc>
+                <a:spcPts val="1650"/>
+              </a:lnSpc>
+              <a:buNone/>
+              <a:defRPr lang="en-US" sz="1350" kern="0" spc="-27" dirty="0" smtClean="0">
+                <a:solidFill>
+                  <a:schemeClr val="bg1"/>
+                </a:solidFill>
+                <a:latin typeface="Segoe UI Variable Display Semibold" pitchFamily="34" charset="0"/>
+                <a:ea typeface="Segoe UI Variable Display Semibold" pitchFamily="34" charset="-122"/>
+                <a:cs typeface="Segoe UI Variable Display Semibold" pitchFamily="34" charset="-120"/>
+              </a:defRPr>
+            </a:lvl1pPr>
+          </a:lstStyle>
+          <a:p>
+            <a:pPr lvl="0"/>
+            <a:r>
+              <a:rPr lang="en-US"/>
+              <a:t>Title</a:t>
+            </a:r>
+          </a:p>
+        </p:txBody>
+      </p:sp>
+      <p:sp>
+        <p:nvSpPr>
+          <p:cNvPr id="20" name="Text Placeholder 19">
+            <a:extLst>
+              <a:ext uri="{FF2B5EF4-FFF2-40B4-BE49-F238E27FC236}">
+                <a16:creationId xmlns:a16="http://schemas.microsoft.com/office/drawing/2014/main" id="{824137E5-8D8D-F109-8E17-8ED6B89B09C7}"/>
+              </a:ext>
+            </a:extLst>
+          </p:cNvPr>
+          <p:cNvSpPr>
+            <a:spLocks noGrp="1"/>
+          </p:cNvSpPr>
+          <p:nvPr>
+            <p:ph type="body" sz="quarter" idx="27" hasCustomPrompt="1"/>
+          </p:nvPr>
+        </p:nvSpPr>
+        <p:spPr>
+          <a:xfrm>
+            <a:off x="5977330" y="1878815"/>
+            <a:ext cx="2628558" cy="238125"/>
+          </a:xfrm>
+          <a:prstGeom prst="rect">
+            <a:avLst/>
+          </a:prstGeom>
+        </p:spPr>
+        <p:txBody>
+          <a:bodyPr/>
+          <a:lstStyle>
+            <a:lvl1pPr marL="0" indent="0" algn="l" defTabSz="342900" rtl="0" eaLnBrk="1" latinLnBrk="0" hangingPunct="1">
+              <a:lnSpc>
+                <a:spcPts val="1650"/>
+              </a:lnSpc>
+              <a:buNone/>
+              <a:defRPr lang="en-US" sz="2325" b="1" i="0" kern="1200" dirty="0" smtClean="0">
+                <a:solidFill>
+                  <a:schemeClr val="accent5"/>
+                </a:solidFill>
+                <a:latin typeface="Segoe UI Variable Display Semibold" pitchFamily="2" charset="0"/>
+                <a:ea typeface="Segoe UI Variable Semibold Display" pitchFamily="34" charset="-122"/>
+                <a:cs typeface="Segoe UI Variable Display Semibold" pitchFamily="2" charset="0"/>
+              </a:defRPr>
+            </a:lvl1pPr>
+          </a:lstStyle>
+          <a:p>
+            <a:pPr lvl="0"/>
+            <a:r>
+              <a:rPr lang="en-US"/>
+              <a:t>03</a:t>
+            </a:r>
+          </a:p>
+        </p:txBody>
+      </p:sp>
+      <p:sp>
+        <p:nvSpPr>
+          <p:cNvPr id="21" name="Text Placeholder 19">
+            <a:extLst>
+              <a:ext uri="{FF2B5EF4-FFF2-40B4-BE49-F238E27FC236}">
+                <a16:creationId xmlns:a16="http://schemas.microsoft.com/office/drawing/2014/main" id="{2918D071-5763-5909-A6AB-183AEBADCE69}"/>
+              </a:ext>
+            </a:extLst>
+          </p:cNvPr>
+          <p:cNvSpPr>
+            <a:spLocks noGrp="1"/>
+          </p:cNvSpPr>
+          <p:nvPr>
+            <p:ph type="body" sz="quarter" idx="28" hasCustomPrompt="1"/>
+          </p:nvPr>
+        </p:nvSpPr>
+        <p:spPr>
+          <a:xfrm>
+            <a:off x="5977330" y="2493293"/>
+            <a:ext cx="2628558" cy="688721"/>
+          </a:xfrm>
+          <a:prstGeom prst="rect">
+            <a:avLst/>
+          </a:prstGeom>
+        </p:spPr>
+        <p:txBody>
+          <a:bodyPr/>
+          <a:lstStyle>
+            <a:lvl1pPr marL="0" marR="0" indent="0" algn="l" defTabSz="342900" rtl="0" eaLnBrk="1" fontAlgn="auto" latinLnBrk="0" hangingPunct="1">
+              <a:lnSpc>
+                <a:spcPts val="1050"/>
+              </a:lnSpc>
+              <a:spcBef>
+                <a:spcPct val="20000"/>
+              </a:spcBef>
+              <a:spcAft>
+                <a:spcPts val="0"/>
+              </a:spcAft>
+              <a:buClrTx/>
+              <a:buSzTx/>
+              <a:buFont typeface="Arial" pitchFamily="34" charset="0"/>
+              <a:buNone/>
+              <a:tabLst/>
+              <a:defRPr lang="en-US" sz="825" kern="1200" dirty="0" smtClean="0">
+                <a:solidFill>
+                  <a:schemeClr val="bg1"/>
+                </a:solidFill>
+                <a:latin typeface="Segoe UI Variable Text Semibold" pitchFamily="34" charset="0"/>
+                <a:ea typeface="Segoe UI Variable Text Semibold" pitchFamily="34" charset="-122"/>
+                <a:cs typeface="Segoe UI Variable Text Semibold" pitchFamily="34" charset="-120"/>
+              </a:defRPr>
+            </a:lvl1pPr>
+          </a:lstStyle>
+          <a:p>
+            <a:r>
+              <a:rPr lang="en-US" sz="750" b="0"/>
+              <a:t>Baking security and trust into the development process ensures that all AI-driven tools and applications are built with security measures integrated from the beginning, protecting both the developers and the end-users.</a:t>
+            </a:r>
+            <a:endParaRPr lang="en-US" sz="750" b="1">
+              <a:latin typeface="Segoe UI Variable Text Semibold" pitchFamily="2" charset="0"/>
+            </a:endParaRPr>
+          </a:p>
+        </p:txBody>
+      </p:sp>
+    </p:spTree>
+    <p:extLst>
+      <p:ext uri="{BB962C8B-B14F-4D97-AF65-F5344CB8AC3E}">
+        <p14:creationId xmlns:p14="http://schemas.microsoft.com/office/powerpoint/2010/main" val="1400175262"/>
+      </p:ext>
+    </p:extLst>
+  </p:cSld>
+  <p:clrMapOvr>
+    <a:masterClrMapping/>
+  </p:clrMapOvr>
+</p:sldLayout>
+</file>
+
+<file path=ppt/slideLayouts/slideLayout13.xml><?xml version="1.0" encoding="utf-8"?>
 <p:sldLayout xmlns:a="http://schemas.openxmlformats.org/drawingml/2006/main" xmlns:r="http://schemas.openxmlformats.org/officeDocument/2006/relationships" xmlns:p="http://schemas.openxmlformats.org/presentationml/2006/main" type="obj" preserve="1">
   <p:cSld name="Title and Content">
     <p:spTree>
@@ -2704,7 +3461,7 @@
             <a:fld id="{3FE51E94-D08C-431E-88FC-7EB62E529A19}" type="datetimeFigureOut">
               <a:rPr lang="en-US" smtClean="0"/>
               <a:pPr/>
-              <a:t>7/26/2025</a:t>
+              <a:t>7/29/2025</a:t>
             </a:fld>
             <a:endParaRPr lang="en-US"/>
           </a:p>
@@ -2873,7 +3630,7 @@
           <a:p>
             <a:fld id="{D088F999-7A4E-6B4F-9FED-EF75B73AD044}" type="datetimeFigureOut">
               <a:rPr lang="en-US" smtClean="0"/>
-              <a:t>7/26/2025</a:t>
+              <a:t>7/29/2025</a:t>
             </a:fld>
             <a:endParaRPr lang="en-US"/>
           </a:p>
@@ -3118,7 +3875,7 @@
           <a:p>
             <a:fld id="{D088F999-7A4E-6B4F-9FED-EF75B73AD044}" type="datetimeFigureOut">
               <a:rPr lang="en-US" smtClean="0"/>
-              <a:t>7/26/2025</a:t>
+              <a:t>7/29/2025</a:t>
             </a:fld>
             <a:endParaRPr lang="en-US"/>
           </a:p>
@@ -3403,7 +4160,7 @@
           <a:p>
             <a:fld id="{D088F999-7A4E-6B4F-9FED-EF75B73AD044}" type="datetimeFigureOut">
               <a:rPr lang="en-US" smtClean="0"/>
-              <a:t>7/26/2025</a:t>
+              <a:t>7/29/2025</a:t>
             </a:fld>
             <a:endParaRPr lang="en-US"/>
           </a:p>
@@ -3822,7 +4579,7 @@
           <a:p>
             <a:fld id="{D088F999-7A4E-6B4F-9FED-EF75B73AD044}" type="datetimeFigureOut">
               <a:rPr lang="en-US" smtClean="0"/>
-              <a:t>7/26/2025</a:t>
+              <a:t>7/29/2025</a:t>
             </a:fld>
             <a:endParaRPr lang="en-US"/>
           </a:p>
@@ -3939,7 +4696,7 @@
           <a:p>
             <a:fld id="{D088F999-7A4E-6B4F-9FED-EF75B73AD044}" type="datetimeFigureOut">
               <a:rPr lang="en-US" smtClean="0"/>
-              <a:t>7/26/2025</a:t>
+              <a:t>7/29/2025</a:t>
             </a:fld>
             <a:endParaRPr lang="en-US"/>
           </a:p>
@@ -4034,7 +4791,7 @@
           <a:p>
             <a:fld id="{D088F999-7A4E-6B4F-9FED-EF75B73AD044}" type="datetimeFigureOut">
               <a:rPr lang="en-US" smtClean="0"/>
-              <a:t>7/26/2025</a:t>
+              <a:t>7/29/2025</a:t>
             </a:fld>
             <a:endParaRPr lang="en-US"/>
           </a:p>
@@ -4309,7 +5066,7 @@
           <a:p>
             <a:fld id="{D088F999-7A4E-6B4F-9FED-EF75B73AD044}" type="datetimeFigureOut">
               <a:rPr lang="en-US" smtClean="0"/>
-              <a:t>7/26/2025</a:t>
+              <a:t>7/29/2025</a:t>
             </a:fld>
             <a:endParaRPr lang="en-US"/>
           </a:p>
@@ -4561,7 +5318,7 @@
           <a:p>
             <a:fld id="{D088F999-7A4E-6B4F-9FED-EF75B73AD044}" type="datetimeFigureOut">
               <a:rPr lang="en-US" smtClean="0"/>
-              <a:t>7/26/2025</a:t>
+              <a:t>7/29/2025</a:t>
             </a:fld>
             <a:endParaRPr lang="en-US"/>
           </a:p>
@@ -4628,7 +5385,7 @@
     <p:bg>
       <p:bgPr>
         <a:blipFill dpi="0" rotWithShape="1">
-          <a:blip r:embed="rId13">
+          <a:blip r:embed="rId14">
             <a:lum/>
           </a:blip>
           <a:srcRect/>
@@ -4781,7 +5538,7 @@
           <a:p>
             <a:fld id="{D088F999-7A4E-6B4F-9FED-EF75B73AD044}" type="datetimeFigureOut">
               <a:rPr lang="en-US" smtClean="0"/>
-              <a:t>7/26/2025</a:t>
+              <a:t>7/29/2025</a:t>
             </a:fld>
             <a:endParaRPr lang="en-US"/>
           </a:p>
@@ -4885,6 +5642,7 @@
     <p:sldLayoutId id="2147483691" r:id="rId9"/>
     <p:sldLayoutId id="2147483692" r:id="rId10"/>
     <p:sldLayoutId id="2147483693" r:id="rId11"/>
+    <p:sldLayoutId id="2147483763" r:id="rId12"/>
   </p:sldLayoutIdLst>
   <p:txStyles>
     <p:titleStyle>
@@ -5298,7 +6056,7 @@
           <a:p>
             <a:fld id="{D088F999-7A4E-6B4F-9FED-EF75B73AD044}" type="datetimeFigureOut">
               <a:rPr lang="en-US" smtClean="0"/>
-              <a:t>7/26/2025</a:t>
+              <a:t>7/29/2025</a:t>
             </a:fld>
             <a:endParaRPr lang="en-US"/>
           </a:p>
@@ -7211,6 +7969,965 @@
 </file>
 
 <file path=ppt/slides/slide16.xml><?xml version="1.0" encoding="utf-8"?>
+<p:sld xmlns:a="http://schemas.openxmlformats.org/drawingml/2006/main" xmlns:r="http://schemas.openxmlformats.org/officeDocument/2006/relationships" xmlns:p="http://schemas.openxmlformats.org/presentationml/2006/main">
+  <p:cSld>
+    <p:bg>
+      <p:bgPr>
+        <a:solidFill>
+          <a:schemeClr val="tx1"/>
+        </a:solidFill>
+        <a:effectLst/>
+      </p:bgPr>
+    </p:bg>
+    <p:spTree>
+      <p:nvGrpSpPr>
+        <p:cNvPr id="1" name="">
+          <a:extLst>
+            <a:ext uri="{FF2B5EF4-FFF2-40B4-BE49-F238E27FC236}">
+              <a16:creationId xmlns:a16="http://schemas.microsoft.com/office/drawing/2014/main" id="{49E30597-756B-34F1-5D8A-5ECF96D41ECF}"/>
+            </a:ext>
+          </a:extLst>
+        </p:cNvPr>
+        <p:cNvGrpSpPr/>
+        <p:nvPr/>
+      </p:nvGrpSpPr>
+      <p:grpSpPr>
+        <a:xfrm>
+          <a:off x="0" y="0"/>
+          <a:ext cx="0" cy="0"/>
+          <a:chOff x="0" y="0"/>
+          <a:chExt cx="0" cy="0"/>
+        </a:xfrm>
+      </p:grpSpPr>
+      <p:sp>
+        <p:nvSpPr>
+          <p:cNvPr id="18" name="Text Placeholder 9">
+            <a:extLst>
+              <a:ext uri="{FF2B5EF4-FFF2-40B4-BE49-F238E27FC236}">
+                <a16:creationId xmlns:a16="http://schemas.microsoft.com/office/drawing/2014/main" id="{B54E5284-0002-372B-A64D-2DD2A558177F}"/>
+              </a:ext>
+            </a:extLst>
+          </p:cNvPr>
+          <p:cNvSpPr txBox="1">
+            <a:spLocks/>
+          </p:cNvSpPr>
+          <p:nvPr/>
+        </p:nvSpPr>
+        <p:spPr>
+          <a:xfrm>
+            <a:off x="1247075" y="2347617"/>
+            <a:ext cx="2628558" cy="238094"/>
+          </a:xfrm>
+          <a:prstGeom prst="rect">
+            <a:avLst/>
+          </a:prstGeom>
+        </p:spPr>
+        <p:txBody>
+          <a:bodyPr/>
+          <a:lstStyle>
+            <a:lvl1pPr marL="0" indent="0" algn="l" defTabSz="914400" rtl="0" eaLnBrk="1" latinLnBrk="0" hangingPunct="1">
+              <a:lnSpc>
+                <a:spcPts val="4400"/>
+              </a:lnSpc>
+              <a:spcBef>
+                <a:spcPct val="20000"/>
+              </a:spcBef>
+              <a:buFont typeface="Arial" pitchFamily="34" charset="0"/>
+              <a:buNone/>
+              <a:defRPr lang="en-US" sz="3600" kern="0" spc="-72" dirty="0" smtClean="0">
+                <a:solidFill>
+                  <a:schemeClr val="bg1"/>
+                </a:solidFill>
+                <a:latin typeface="Segoe UI Variable Display Semibold" pitchFamily="34" charset="0"/>
+                <a:ea typeface="Segoe UI Variable Display Semibold" pitchFamily="34" charset="-122"/>
+                <a:cs typeface="Segoe UI Variable Display Semibold" pitchFamily="34" charset="-120"/>
+              </a:defRPr>
+            </a:lvl1pPr>
+            <a:lvl2pPr marL="742950" indent="-285750" algn="l" defTabSz="914400" rtl="0" eaLnBrk="1" latinLnBrk="0" hangingPunct="1">
+              <a:spcBef>
+                <a:spcPct val="20000"/>
+              </a:spcBef>
+              <a:buFont typeface="Arial" pitchFamily="34" charset="0"/>
+              <a:buChar char="–"/>
+              <a:defRPr sz="2800" kern="1200">
+                <a:solidFill>
+                  <a:schemeClr val="tx1"/>
+                </a:solidFill>
+                <a:latin typeface="+mn-lt"/>
+                <a:ea typeface="+mn-ea"/>
+                <a:cs typeface="+mn-cs"/>
+              </a:defRPr>
+            </a:lvl2pPr>
+            <a:lvl3pPr marL="1143000" indent="-228600" algn="l" defTabSz="914400" rtl="0" eaLnBrk="1" latinLnBrk="0" hangingPunct="1">
+              <a:spcBef>
+                <a:spcPct val="20000"/>
+              </a:spcBef>
+              <a:buFont typeface="Arial" pitchFamily="34" charset="0"/>
+              <a:buChar char="•"/>
+              <a:defRPr sz="2400" kern="1200">
+                <a:solidFill>
+                  <a:schemeClr val="tx1"/>
+                </a:solidFill>
+                <a:latin typeface="+mn-lt"/>
+                <a:ea typeface="+mn-ea"/>
+                <a:cs typeface="+mn-cs"/>
+              </a:defRPr>
+            </a:lvl3pPr>
+            <a:lvl4pPr marL="1600200" indent="-228600" algn="l" defTabSz="914400" rtl="0" eaLnBrk="1" latinLnBrk="0" hangingPunct="1">
+              <a:spcBef>
+                <a:spcPct val="20000"/>
+              </a:spcBef>
+              <a:buFont typeface="Arial" pitchFamily="34" charset="0"/>
+              <a:buChar char="–"/>
+              <a:defRPr sz="2000" kern="1200">
+                <a:solidFill>
+                  <a:schemeClr val="tx1"/>
+                </a:solidFill>
+                <a:latin typeface="+mn-lt"/>
+                <a:ea typeface="+mn-ea"/>
+                <a:cs typeface="+mn-cs"/>
+              </a:defRPr>
+            </a:lvl4pPr>
+            <a:lvl5pPr marL="2057400" indent="-228600" algn="l" defTabSz="914400" rtl="0" eaLnBrk="1" latinLnBrk="0" hangingPunct="1">
+              <a:spcBef>
+                <a:spcPct val="20000"/>
+              </a:spcBef>
+              <a:buFont typeface="Arial" pitchFamily="34" charset="0"/>
+              <a:buChar char="»"/>
+              <a:defRPr sz="2000" kern="1200">
+                <a:solidFill>
+                  <a:schemeClr val="tx1"/>
+                </a:solidFill>
+                <a:latin typeface="+mn-lt"/>
+                <a:ea typeface="+mn-ea"/>
+                <a:cs typeface="+mn-cs"/>
+              </a:defRPr>
+            </a:lvl5pPr>
+            <a:lvl6pPr marL="2514600" indent="-228600" algn="l" defTabSz="914400" rtl="0" eaLnBrk="1" latinLnBrk="0" hangingPunct="1">
+              <a:spcBef>
+                <a:spcPct val="20000"/>
+              </a:spcBef>
+              <a:buFont typeface="Arial" pitchFamily="34" charset="0"/>
+              <a:buChar char="•"/>
+              <a:defRPr sz="2000" kern="1200">
+                <a:solidFill>
+                  <a:schemeClr val="tx1"/>
+                </a:solidFill>
+                <a:latin typeface="+mn-lt"/>
+                <a:ea typeface="+mn-ea"/>
+                <a:cs typeface="+mn-cs"/>
+              </a:defRPr>
+            </a:lvl6pPr>
+            <a:lvl7pPr marL="2971800" indent="-228600" algn="l" defTabSz="914400" rtl="0" eaLnBrk="1" latinLnBrk="0" hangingPunct="1">
+              <a:spcBef>
+                <a:spcPct val="20000"/>
+              </a:spcBef>
+              <a:buFont typeface="Arial" pitchFamily="34" charset="0"/>
+              <a:buChar char="•"/>
+              <a:defRPr sz="2000" kern="1200">
+                <a:solidFill>
+                  <a:schemeClr val="tx1"/>
+                </a:solidFill>
+                <a:latin typeface="+mn-lt"/>
+                <a:ea typeface="+mn-ea"/>
+                <a:cs typeface="+mn-cs"/>
+              </a:defRPr>
+            </a:lvl7pPr>
+            <a:lvl8pPr marL="3429000" indent="-228600" algn="l" defTabSz="914400" rtl="0" eaLnBrk="1" latinLnBrk="0" hangingPunct="1">
+              <a:spcBef>
+                <a:spcPct val="20000"/>
+              </a:spcBef>
+              <a:buFont typeface="Arial" pitchFamily="34" charset="0"/>
+              <a:buChar char="•"/>
+              <a:defRPr sz="2000" kern="1200">
+                <a:solidFill>
+                  <a:schemeClr val="tx1"/>
+                </a:solidFill>
+                <a:latin typeface="+mn-lt"/>
+                <a:ea typeface="+mn-ea"/>
+                <a:cs typeface="+mn-cs"/>
+              </a:defRPr>
+            </a:lvl8pPr>
+            <a:lvl9pPr marL="3886200" indent="-228600" algn="l" defTabSz="914400" rtl="0" eaLnBrk="1" latinLnBrk="0" hangingPunct="1">
+              <a:spcBef>
+                <a:spcPct val="20000"/>
+              </a:spcBef>
+              <a:buFont typeface="Arial" pitchFamily="34" charset="0"/>
+              <a:buChar char="•"/>
+              <a:defRPr sz="2000" kern="1200">
+                <a:solidFill>
+                  <a:schemeClr val="tx1"/>
+                </a:solidFill>
+                <a:latin typeface="+mn-lt"/>
+                <a:ea typeface="+mn-ea"/>
+                <a:cs typeface="+mn-cs"/>
+              </a:defRPr>
+            </a:lvl9pPr>
+          </a:lstStyle>
+          <a:p>
+            <a:pPr defTabSz="342900">
+              <a:lnSpc>
+                <a:spcPts val="1650"/>
+              </a:lnSpc>
+              <a:defRPr/>
+            </a:pPr>
+            <a:r>
+              <a:rPr lang="en-US" sz="2250" b="1" spc="-27">
+                <a:solidFill>
+                  <a:srgbClr val="FEFFFE"/>
+                </a:solidFill>
+              </a:rPr>
+              <a:t>Visual Studio Hub</a:t>
+            </a:r>
+          </a:p>
+        </p:txBody>
+      </p:sp>
+      <p:sp>
+        <p:nvSpPr>
+          <p:cNvPr id="22" name="Text Placeholder 11">
+            <a:extLst>
+              <a:ext uri="{FF2B5EF4-FFF2-40B4-BE49-F238E27FC236}">
+                <a16:creationId xmlns:a16="http://schemas.microsoft.com/office/drawing/2014/main" id="{CBC3E757-74F2-4FA9-1183-0584420929C2}"/>
+              </a:ext>
+            </a:extLst>
+          </p:cNvPr>
+          <p:cNvSpPr txBox="1">
+            <a:spLocks/>
+          </p:cNvSpPr>
+          <p:nvPr/>
+        </p:nvSpPr>
+        <p:spPr>
+          <a:xfrm>
+            <a:off x="1247075" y="2720002"/>
+            <a:ext cx="2628558" cy="1013176"/>
+          </a:xfrm>
+          <a:prstGeom prst="rect">
+            <a:avLst/>
+          </a:prstGeom>
+        </p:spPr>
+        <p:txBody>
+          <a:bodyPr/>
+          <a:lstStyle>
+            <a:lvl1pPr marL="0" marR="0" indent="0" algn="l" defTabSz="914400" rtl="0" eaLnBrk="1" fontAlgn="auto" latinLnBrk="0" hangingPunct="1">
+              <a:lnSpc>
+                <a:spcPts val="2800"/>
+              </a:lnSpc>
+              <a:spcBef>
+                <a:spcPct val="20000"/>
+              </a:spcBef>
+              <a:spcAft>
+                <a:spcPts val="0"/>
+              </a:spcAft>
+              <a:buClrTx/>
+              <a:buSzTx/>
+              <a:buFont typeface="Arial" pitchFamily="34" charset="0"/>
+              <a:buNone/>
+              <a:tabLst/>
+              <a:defRPr lang="en-US" sz="2200" kern="1200" dirty="0" smtClean="0">
+                <a:solidFill>
+                  <a:schemeClr val="bg1"/>
+                </a:solidFill>
+                <a:latin typeface="Segoe UI Variable Text Semibold" pitchFamily="34" charset="0"/>
+                <a:ea typeface="Segoe UI Variable Text Semibold" pitchFamily="34" charset="-122"/>
+                <a:cs typeface="Segoe UI Variable Text Semibold" pitchFamily="34" charset="-120"/>
+              </a:defRPr>
+            </a:lvl1pPr>
+            <a:lvl2pPr marL="742950" indent="-285750" algn="l" defTabSz="914400" rtl="0" eaLnBrk="1" latinLnBrk="0" hangingPunct="1">
+              <a:spcBef>
+                <a:spcPct val="20000"/>
+              </a:spcBef>
+              <a:buFont typeface="Arial" pitchFamily="34" charset="0"/>
+              <a:buChar char="–"/>
+              <a:defRPr sz="2800" kern="1200">
+                <a:solidFill>
+                  <a:schemeClr val="tx1"/>
+                </a:solidFill>
+                <a:latin typeface="+mn-lt"/>
+                <a:ea typeface="+mn-ea"/>
+                <a:cs typeface="+mn-cs"/>
+              </a:defRPr>
+            </a:lvl2pPr>
+            <a:lvl3pPr marL="1143000" indent="-228600" algn="l" defTabSz="914400" rtl="0" eaLnBrk="1" latinLnBrk="0" hangingPunct="1">
+              <a:spcBef>
+                <a:spcPct val="20000"/>
+              </a:spcBef>
+              <a:buFont typeface="Arial" pitchFamily="34" charset="0"/>
+              <a:buChar char="•"/>
+              <a:defRPr sz="2400" kern="1200">
+                <a:solidFill>
+                  <a:schemeClr val="tx1"/>
+                </a:solidFill>
+                <a:latin typeface="+mn-lt"/>
+                <a:ea typeface="+mn-ea"/>
+                <a:cs typeface="+mn-cs"/>
+              </a:defRPr>
+            </a:lvl3pPr>
+            <a:lvl4pPr marL="1600200" indent="-228600" algn="l" defTabSz="914400" rtl="0" eaLnBrk="1" latinLnBrk="0" hangingPunct="1">
+              <a:spcBef>
+                <a:spcPct val="20000"/>
+              </a:spcBef>
+              <a:buFont typeface="Arial" pitchFamily="34" charset="0"/>
+              <a:buChar char="–"/>
+              <a:defRPr sz="2000" kern="1200">
+                <a:solidFill>
+                  <a:schemeClr val="tx1"/>
+                </a:solidFill>
+                <a:latin typeface="+mn-lt"/>
+                <a:ea typeface="+mn-ea"/>
+                <a:cs typeface="+mn-cs"/>
+              </a:defRPr>
+            </a:lvl4pPr>
+            <a:lvl5pPr marL="2057400" indent="-228600" algn="l" defTabSz="914400" rtl="0" eaLnBrk="1" latinLnBrk="0" hangingPunct="1">
+              <a:spcBef>
+                <a:spcPct val="20000"/>
+              </a:spcBef>
+              <a:buFont typeface="Arial" pitchFamily="34" charset="0"/>
+              <a:buChar char="»"/>
+              <a:defRPr sz="2000" kern="1200">
+                <a:solidFill>
+                  <a:schemeClr val="tx1"/>
+                </a:solidFill>
+                <a:latin typeface="+mn-lt"/>
+                <a:ea typeface="+mn-ea"/>
+                <a:cs typeface="+mn-cs"/>
+              </a:defRPr>
+            </a:lvl5pPr>
+            <a:lvl6pPr marL="2514600" indent="-228600" algn="l" defTabSz="914400" rtl="0" eaLnBrk="1" latinLnBrk="0" hangingPunct="1">
+              <a:spcBef>
+                <a:spcPct val="20000"/>
+              </a:spcBef>
+              <a:buFont typeface="Arial" pitchFamily="34" charset="0"/>
+              <a:buChar char="•"/>
+              <a:defRPr sz="2000" kern="1200">
+                <a:solidFill>
+                  <a:schemeClr val="tx1"/>
+                </a:solidFill>
+                <a:latin typeface="+mn-lt"/>
+                <a:ea typeface="+mn-ea"/>
+                <a:cs typeface="+mn-cs"/>
+              </a:defRPr>
+            </a:lvl6pPr>
+            <a:lvl7pPr marL="2971800" indent="-228600" algn="l" defTabSz="914400" rtl="0" eaLnBrk="1" latinLnBrk="0" hangingPunct="1">
+              <a:spcBef>
+                <a:spcPct val="20000"/>
+              </a:spcBef>
+              <a:buFont typeface="Arial" pitchFamily="34" charset="0"/>
+              <a:buChar char="•"/>
+              <a:defRPr sz="2000" kern="1200">
+                <a:solidFill>
+                  <a:schemeClr val="tx1"/>
+                </a:solidFill>
+                <a:latin typeface="+mn-lt"/>
+                <a:ea typeface="+mn-ea"/>
+                <a:cs typeface="+mn-cs"/>
+              </a:defRPr>
+            </a:lvl7pPr>
+            <a:lvl8pPr marL="3429000" indent="-228600" algn="l" defTabSz="914400" rtl="0" eaLnBrk="1" latinLnBrk="0" hangingPunct="1">
+              <a:spcBef>
+                <a:spcPct val="20000"/>
+              </a:spcBef>
+              <a:buFont typeface="Arial" pitchFamily="34" charset="0"/>
+              <a:buChar char="•"/>
+              <a:defRPr sz="2000" kern="1200">
+                <a:solidFill>
+                  <a:schemeClr val="tx1"/>
+                </a:solidFill>
+                <a:latin typeface="+mn-lt"/>
+                <a:ea typeface="+mn-ea"/>
+                <a:cs typeface="+mn-cs"/>
+              </a:defRPr>
+            </a:lvl8pPr>
+            <a:lvl9pPr marL="3886200" indent="-228600" algn="l" defTabSz="914400" rtl="0" eaLnBrk="1" latinLnBrk="0" hangingPunct="1">
+              <a:spcBef>
+                <a:spcPct val="20000"/>
+              </a:spcBef>
+              <a:buFont typeface="Arial" pitchFamily="34" charset="0"/>
+              <a:buChar char="•"/>
+              <a:defRPr sz="2000" kern="1200">
+                <a:solidFill>
+                  <a:schemeClr val="tx1"/>
+                </a:solidFill>
+                <a:latin typeface="+mn-lt"/>
+                <a:ea typeface="+mn-ea"/>
+                <a:cs typeface="+mn-cs"/>
+              </a:defRPr>
+            </a:lvl9pPr>
+          </a:lstStyle>
+          <a:p>
+            <a:pPr defTabSz="342900">
+              <a:lnSpc>
+                <a:spcPts val="1050"/>
+              </a:lnSpc>
+              <a:defRPr/>
+            </a:pPr>
+            <a:r>
+              <a:rPr lang="en-US" sz="1200" dirty="0">
+                <a:solidFill>
+                  <a:srgbClr val="FEFFFE"/>
+                </a:solidFill>
+                <a:latin typeface="Segoe UI Variable Text" pitchFamily="2" charset="0"/>
+              </a:rPr>
+              <a:t>Discover tools, tips, and resources to supercharge your development experience.</a:t>
+            </a:r>
+          </a:p>
+          <a:p>
+            <a:pPr defTabSz="342900">
+              <a:lnSpc>
+                <a:spcPts val="1050"/>
+              </a:lnSpc>
+              <a:defRPr/>
+            </a:pPr>
+            <a:br>
+              <a:rPr lang="en-US" sz="1200" dirty="0">
+                <a:solidFill>
+                  <a:srgbClr val="FEFFFE"/>
+                </a:solidFill>
+                <a:latin typeface="Segoe UI Variable Text" pitchFamily="2" charset="0"/>
+              </a:rPr>
+            </a:br>
+            <a:r>
+              <a:rPr lang="en-US" sz="1200" dirty="0">
+                <a:solidFill>
+                  <a:srgbClr val="FEFFFE"/>
+                </a:solidFill>
+                <a:latin typeface="Segoe UI Variable Text" pitchFamily="2" charset="0"/>
+              </a:rPr>
+              <a:t>👉 https://visualstudio.com/hub</a:t>
+            </a:r>
+            <a:endParaRPr lang="en-US" sz="1200" b="1" dirty="0">
+              <a:solidFill>
+                <a:srgbClr val="FEFFFE"/>
+              </a:solidFill>
+              <a:latin typeface="Segoe UI Variable Text" pitchFamily="2" charset="0"/>
+            </a:endParaRPr>
+          </a:p>
+        </p:txBody>
+      </p:sp>
+      <p:pic>
+        <p:nvPicPr>
+          <p:cNvPr id="23" name="Image 16" descr=" ">
+            <a:extLst>
+              <a:ext uri="{FF2B5EF4-FFF2-40B4-BE49-F238E27FC236}">
+                <a16:creationId xmlns:a16="http://schemas.microsoft.com/office/drawing/2014/main" id="{5550A2AB-1BF2-D1BC-983F-4FBD87223B91}"/>
+              </a:ext>
+            </a:extLst>
+          </p:cNvPr>
+          <p:cNvPicPr>
+            <a:picLocks noChangeAspect="1"/>
+          </p:cNvPicPr>
+          <p:nvPr/>
+        </p:nvPicPr>
+        <p:blipFill>
+          <a:blip r:embed="rId3">
+            <a:extLst>
+              <a:ext uri="{96DAC541-7B7A-43D3-8B79-37D633B846F1}">
+                <asvg:svgBlip xmlns:asvg="http://schemas.microsoft.com/office/drawing/2016/SVG/main" r:embed="rId4"/>
+              </a:ext>
+            </a:extLst>
+          </a:blip>
+          <a:stretch>
+            <a:fillRect/>
+          </a:stretch>
+        </p:blipFill>
+        <p:spPr>
+          <a:xfrm>
+            <a:off x="1247076" y="1970136"/>
+            <a:ext cx="230468" cy="243190"/>
+          </a:xfrm>
+          <a:prstGeom prst="rect">
+            <a:avLst/>
+          </a:prstGeom>
+        </p:spPr>
+      </p:pic>
+      <p:sp>
+        <p:nvSpPr>
+          <p:cNvPr id="25" name="Text Placeholder 24">
+            <a:extLst>
+              <a:ext uri="{FF2B5EF4-FFF2-40B4-BE49-F238E27FC236}">
+                <a16:creationId xmlns:a16="http://schemas.microsoft.com/office/drawing/2014/main" id="{E40C5672-46DF-9093-B255-785FA22115E7}"/>
+              </a:ext>
+            </a:extLst>
+          </p:cNvPr>
+          <p:cNvSpPr>
+            <a:spLocks noGrp="1"/>
+          </p:cNvSpPr>
+          <p:nvPr>
+            <p:ph type="body" sz="quarter" idx="15"/>
+          </p:nvPr>
+        </p:nvSpPr>
+        <p:spPr>
+          <a:xfrm>
+            <a:off x="406262" y="622438"/>
+            <a:ext cx="8432937" cy="577712"/>
+          </a:xfrm>
+        </p:spPr>
+        <p:txBody>
+          <a:bodyPr>
+            <a:normAutofit/>
+          </a:bodyPr>
+          <a:lstStyle/>
+          <a:p>
+            <a:pPr algn="ctr"/>
+            <a:r>
+              <a:rPr lang="en-US" sz="3000" b="1" dirty="0"/>
+              <a:t>Stay Connected &amp; Keep Learning</a:t>
+            </a:r>
+          </a:p>
+          <a:p>
+            <a:pPr algn="ctr"/>
+            <a:endParaRPr lang="en-US" sz="3000" dirty="0"/>
+          </a:p>
+        </p:txBody>
+      </p:sp>
+      <p:sp>
+        <p:nvSpPr>
+          <p:cNvPr id="32" name="Text Placeholder 9">
+            <a:extLst>
+              <a:ext uri="{FF2B5EF4-FFF2-40B4-BE49-F238E27FC236}">
+                <a16:creationId xmlns:a16="http://schemas.microsoft.com/office/drawing/2014/main" id="{67180719-CBDE-8910-3582-6A0BB3EED0C6}"/>
+              </a:ext>
+            </a:extLst>
+          </p:cNvPr>
+          <p:cNvSpPr txBox="1">
+            <a:spLocks/>
+          </p:cNvSpPr>
+          <p:nvPr/>
+        </p:nvSpPr>
+        <p:spPr>
+          <a:xfrm>
+            <a:off x="5009030" y="2347617"/>
+            <a:ext cx="3068170" cy="238094"/>
+          </a:xfrm>
+          <a:prstGeom prst="rect">
+            <a:avLst/>
+          </a:prstGeom>
+        </p:spPr>
+        <p:txBody>
+          <a:bodyPr/>
+          <a:lstStyle>
+            <a:lvl1pPr marL="0" indent="0" algn="l" defTabSz="914400" rtl="0" eaLnBrk="1" latinLnBrk="0" hangingPunct="1">
+              <a:lnSpc>
+                <a:spcPts val="4400"/>
+              </a:lnSpc>
+              <a:spcBef>
+                <a:spcPct val="20000"/>
+              </a:spcBef>
+              <a:buFont typeface="Arial" pitchFamily="34" charset="0"/>
+              <a:buNone/>
+              <a:defRPr lang="en-US" sz="3600" kern="0" spc="-72" dirty="0" smtClean="0">
+                <a:solidFill>
+                  <a:schemeClr val="bg1"/>
+                </a:solidFill>
+                <a:latin typeface="Segoe UI Variable Display Semibold" pitchFamily="34" charset="0"/>
+                <a:ea typeface="Segoe UI Variable Display Semibold" pitchFamily="34" charset="-122"/>
+                <a:cs typeface="Segoe UI Variable Display Semibold" pitchFamily="34" charset="-120"/>
+              </a:defRPr>
+            </a:lvl1pPr>
+            <a:lvl2pPr marL="742950" indent="-285750" algn="l" defTabSz="914400" rtl="0" eaLnBrk="1" latinLnBrk="0" hangingPunct="1">
+              <a:spcBef>
+                <a:spcPct val="20000"/>
+              </a:spcBef>
+              <a:buFont typeface="Arial" pitchFamily="34" charset="0"/>
+              <a:buChar char="–"/>
+              <a:defRPr sz="2800" kern="1200">
+                <a:solidFill>
+                  <a:schemeClr val="tx1"/>
+                </a:solidFill>
+                <a:latin typeface="+mn-lt"/>
+                <a:ea typeface="+mn-ea"/>
+                <a:cs typeface="+mn-cs"/>
+              </a:defRPr>
+            </a:lvl2pPr>
+            <a:lvl3pPr marL="1143000" indent="-228600" algn="l" defTabSz="914400" rtl="0" eaLnBrk="1" latinLnBrk="0" hangingPunct="1">
+              <a:spcBef>
+                <a:spcPct val="20000"/>
+              </a:spcBef>
+              <a:buFont typeface="Arial" pitchFamily="34" charset="0"/>
+              <a:buChar char="•"/>
+              <a:defRPr sz="2400" kern="1200">
+                <a:solidFill>
+                  <a:schemeClr val="tx1"/>
+                </a:solidFill>
+                <a:latin typeface="+mn-lt"/>
+                <a:ea typeface="+mn-ea"/>
+                <a:cs typeface="+mn-cs"/>
+              </a:defRPr>
+            </a:lvl3pPr>
+            <a:lvl4pPr marL="1600200" indent="-228600" algn="l" defTabSz="914400" rtl="0" eaLnBrk="1" latinLnBrk="0" hangingPunct="1">
+              <a:spcBef>
+                <a:spcPct val="20000"/>
+              </a:spcBef>
+              <a:buFont typeface="Arial" pitchFamily="34" charset="0"/>
+              <a:buChar char="–"/>
+              <a:defRPr sz="2000" kern="1200">
+                <a:solidFill>
+                  <a:schemeClr val="tx1"/>
+                </a:solidFill>
+                <a:latin typeface="+mn-lt"/>
+                <a:ea typeface="+mn-ea"/>
+                <a:cs typeface="+mn-cs"/>
+              </a:defRPr>
+            </a:lvl4pPr>
+            <a:lvl5pPr marL="2057400" indent="-228600" algn="l" defTabSz="914400" rtl="0" eaLnBrk="1" latinLnBrk="0" hangingPunct="1">
+              <a:spcBef>
+                <a:spcPct val="20000"/>
+              </a:spcBef>
+              <a:buFont typeface="Arial" pitchFamily="34" charset="0"/>
+              <a:buChar char="»"/>
+              <a:defRPr sz="2000" kern="1200">
+                <a:solidFill>
+                  <a:schemeClr val="tx1"/>
+                </a:solidFill>
+                <a:latin typeface="+mn-lt"/>
+                <a:ea typeface="+mn-ea"/>
+                <a:cs typeface="+mn-cs"/>
+              </a:defRPr>
+            </a:lvl5pPr>
+            <a:lvl6pPr marL="2514600" indent="-228600" algn="l" defTabSz="914400" rtl="0" eaLnBrk="1" latinLnBrk="0" hangingPunct="1">
+              <a:spcBef>
+                <a:spcPct val="20000"/>
+              </a:spcBef>
+              <a:buFont typeface="Arial" pitchFamily="34" charset="0"/>
+              <a:buChar char="•"/>
+              <a:defRPr sz="2000" kern="1200">
+                <a:solidFill>
+                  <a:schemeClr val="tx1"/>
+                </a:solidFill>
+                <a:latin typeface="+mn-lt"/>
+                <a:ea typeface="+mn-ea"/>
+                <a:cs typeface="+mn-cs"/>
+              </a:defRPr>
+            </a:lvl6pPr>
+            <a:lvl7pPr marL="2971800" indent="-228600" algn="l" defTabSz="914400" rtl="0" eaLnBrk="1" latinLnBrk="0" hangingPunct="1">
+              <a:spcBef>
+                <a:spcPct val="20000"/>
+              </a:spcBef>
+              <a:buFont typeface="Arial" pitchFamily="34" charset="0"/>
+              <a:buChar char="•"/>
+              <a:defRPr sz="2000" kern="1200">
+                <a:solidFill>
+                  <a:schemeClr val="tx1"/>
+                </a:solidFill>
+                <a:latin typeface="+mn-lt"/>
+                <a:ea typeface="+mn-ea"/>
+                <a:cs typeface="+mn-cs"/>
+              </a:defRPr>
+            </a:lvl7pPr>
+            <a:lvl8pPr marL="3429000" indent="-228600" algn="l" defTabSz="914400" rtl="0" eaLnBrk="1" latinLnBrk="0" hangingPunct="1">
+              <a:spcBef>
+                <a:spcPct val="20000"/>
+              </a:spcBef>
+              <a:buFont typeface="Arial" pitchFamily="34" charset="0"/>
+              <a:buChar char="•"/>
+              <a:defRPr sz="2000" kern="1200">
+                <a:solidFill>
+                  <a:schemeClr val="tx1"/>
+                </a:solidFill>
+                <a:latin typeface="+mn-lt"/>
+                <a:ea typeface="+mn-ea"/>
+                <a:cs typeface="+mn-cs"/>
+              </a:defRPr>
+            </a:lvl8pPr>
+            <a:lvl9pPr marL="3886200" indent="-228600" algn="l" defTabSz="914400" rtl="0" eaLnBrk="1" latinLnBrk="0" hangingPunct="1">
+              <a:spcBef>
+                <a:spcPct val="20000"/>
+              </a:spcBef>
+              <a:buFont typeface="Arial" pitchFamily="34" charset="0"/>
+              <a:buChar char="•"/>
+              <a:defRPr sz="2000" kern="1200">
+                <a:solidFill>
+                  <a:schemeClr val="tx1"/>
+                </a:solidFill>
+                <a:latin typeface="+mn-lt"/>
+                <a:ea typeface="+mn-ea"/>
+                <a:cs typeface="+mn-cs"/>
+              </a:defRPr>
+            </a:lvl9pPr>
+          </a:lstStyle>
+          <a:p>
+            <a:pPr defTabSz="342900">
+              <a:lnSpc>
+                <a:spcPts val="1650"/>
+              </a:lnSpc>
+              <a:defRPr/>
+            </a:pPr>
+            <a:r>
+              <a:rPr lang="en-US" sz="2250" b="1" spc="-27" dirty="0" err="1">
+                <a:solidFill>
+                  <a:srgbClr val="FEFFFE"/>
+                </a:solidFill>
+              </a:rPr>
+              <a:t>VSLive</a:t>
+            </a:r>
+            <a:r>
+              <a:rPr lang="en-US" sz="2250" b="1" spc="-27" dirty="0">
+                <a:solidFill>
+                  <a:srgbClr val="FEFFFE"/>
+                </a:solidFill>
+              </a:rPr>
+              <a:t>! On-Demand</a:t>
+            </a:r>
+          </a:p>
+        </p:txBody>
+      </p:sp>
+      <p:sp>
+        <p:nvSpPr>
+          <p:cNvPr id="33" name="Text Placeholder 11">
+            <a:extLst>
+              <a:ext uri="{FF2B5EF4-FFF2-40B4-BE49-F238E27FC236}">
+                <a16:creationId xmlns:a16="http://schemas.microsoft.com/office/drawing/2014/main" id="{084654E2-218A-5F4D-2BEF-392101082F94}"/>
+              </a:ext>
+            </a:extLst>
+          </p:cNvPr>
+          <p:cNvSpPr txBox="1">
+            <a:spLocks/>
+          </p:cNvSpPr>
+          <p:nvPr/>
+        </p:nvSpPr>
+        <p:spPr>
+          <a:xfrm>
+            <a:off x="5009030" y="2720002"/>
+            <a:ext cx="2628558" cy="688632"/>
+          </a:xfrm>
+          <a:prstGeom prst="rect">
+            <a:avLst/>
+          </a:prstGeom>
+        </p:spPr>
+        <p:txBody>
+          <a:bodyPr/>
+          <a:lstStyle>
+            <a:lvl1pPr marL="0" marR="0" indent="0" algn="l" defTabSz="914400" rtl="0" eaLnBrk="1" fontAlgn="auto" latinLnBrk="0" hangingPunct="1">
+              <a:lnSpc>
+                <a:spcPts val="2800"/>
+              </a:lnSpc>
+              <a:spcBef>
+                <a:spcPct val="20000"/>
+              </a:spcBef>
+              <a:spcAft>
+                <a:spcPts val="0"/>
+              </a:spcAft>
+              <a:buClrTx/>
+              <a:buSzTx/>
+              <a:buFont typeface="Arial" pitchFamily="34" charset="0"/>
+              <a:buNone/>
+              <a:tabLst/>
+              <a:defRPr lang="en-US" sz="2200" kern="1200" dirty="0" smtClean="0">
+                <a:solidFill>
+                  <a:schemeClr val="bg1"/>
+                </a:solidFill>
+                <a:latin typeface="Segoe UI Variable Text Semibold" pitchFamily="34" charset="0"/>
+                <a:ea typeface="Segoe UI Variable Text Semibold" pitchFamily="34" charset="-122"/>
+                <a:cs typeface="Segoe UI Variable Text Semibold" pitchFamily="34" charset="-120"/>
+              </a:defRPr>
+            </a:lvl1pPr>
+            <a:lvl2pPr marL="742950" indent="-285750" algn="l" defTabSz="914400" rtl="0" eaLnBrk="1" latinLnBrk="0" hangingPunct="1">
+              <a:spcBef>
+                <a:spcPct val="20000"/>
+              </a:spcBef>
+              <a:buFont typeface="Arial" pitchFamily="34" charset="0"/>
+              <a:buChar char="–"/>
+              <a:defRPr sz="2800" kern="1200">
+                <a:solidFill>
+                  <a:schemeClr val="tx1"/>
+                </a:solidFill>
+                <a:latin typeface="+mn-lt"/>
+                <a:ea typeface="+mn-ea"/>
+                <a:cs typeface="+mn-cs"/>
+              </a:defRPr>
+            </a:lvl2pPr>
+            <a:lvl3pPr marL="1143000" indent="-228600" algn="l" defTabSz="914400" rtl="0" eaLnBrk="1" latinLnBrk="0" hangingPunct="1">
+              <a:spcBef>
+                <a:spcPct val="20000"/>
+              </a:spcBef>
+              <a:buFont typeface="Arial" pitchFamily="34" charset="0"/>
+              <a:buChar char="•"/>
+              <a:defRPr sz="2400" kern="1200">
+                <a:solidFill>
+                  <a:schemeClr val="tx1"/>
+                </a:solidFill>
+                <a:latin typeface="+mn-lt"/>
+                <a:ea typeface="+mn-ea"/>
+                <a:cs typeface="+mn-cs"/>
+              </a:defRPr>
+            </a:lvl3pPr>
+            <a:lvl4pPr marL="1600200" indent="-228600" algn="l" defTabSz="914400" rtl="0" eaLnBrk="1" latinLnBrk="0" hangingPunct="1">
+              <a:spcBef>
+                <a:spcPct val="20000"/>
+              </a:spcBef>
+              <a:buFont typeface="Arial" pitchFamily="34" charset="0"/>
+              <a:buChar char="–"/>
+              <a:defRPr sz="2000" kern="1200">
+                <a:solidFill>
+                  <a:schemeClr val="tx1"/>
+                </a:solidFill>
+                <a:latin typeface="+mn-lt"/>
+                <a:ea typeface="+mn-ea"/>
+                <a:cs typeface="+mn-cs"/>
+              </a:defRPr>
+            </a:lvl4pPr>
+            <a:lvl5pPr marL="2057400" indent="-228600" algn="l" defTabSz="914400" rtl="0" eaLnBrk="1" latinLnBrk="0" hangingPunct="1">
+              <a:spcBef>
+                <a:spcPct val="20000"/>
+              </a:spcBef>
+              <a:buFont typeface="Arial" pitchFamily="34" charset="0"/>
+              <a:buChar char="»"/>
+              <a:defRPr sz="2000" kern="1200">
+                <a:solidFill>
+                  <a:schemeClr val="tx1"/>
+                </a:solidFill>
+                <a:latin typeface="+mn-lt"/>
+                <a:ea typeface="+mn-ea"/>
+                <a:cs typeface="+mn-cs"/>
+              </a:defRPr>
+            </a:lvl5pPr>
+            <a:lvl6pPr marL="2514600" indent="-228600" algn="l" defTabSz="914400" rtl="0" eaLnBrk="1" latinLnBrk="0" hangingPunct="1">
+              <a:spcBef>
+                <a:spcPct val="20000"/>
+              </a:spcBef>
+              <a:buFont typeface="Arial" pitchFamily="34" charset="0"/>
+              <a:buChar char="•"/>
+              <a:defRPr sz="2000" kern="1200">
+                <a:solidFill>
+                  <a:schemeClr val="tx1"/>
+                </a:solidFill>
+                <a:latin typeface="+mn-lt"/>
+                <a:ea typeface="+mn-ea"/>
+                <a:cs typeface="+mn-cs"/>
+              </a:defRPr>
+            </a:lvl6pPr>
+            <a:lvl7pPr marL="2971800" indent="-228600" algn="l" defTabSz="914400" rtl="0" eaLnBrk="1" latinLnBrk="0" hangingPunct="1">
+              <a:spcBef>
+                <a:spcPct val="20000"/>
+              </a:spcBef>
+              <a:buFont typeface="Arial" pitchFamily="34" charset="0"/>
+              <a:buChar char="•"/>
+              <a:defRPr sz="2000" kern="1200">
+                <a:solidFill>
+                  <a:schemeClr val="tx1"/>
+                </a:solidFill>
+                <a:latin typeface="+mn-lt"/>
+                <a:ea typeface="+mn-ea"/>
+                <a:cs typeface="+mn-cs"/>
+              </a:defRPr>
+            </a:lvl7pPr>
+            <a:lvl8pPr marL="3429000" indent="-228600" algn="l" defTabSz="914400" rtl="0" eaLnBrk="1" latinLnBrk="0" hangingPunct="1">
+              <a:spcBef>
+                <a:spcPct val="20000"/>
+              </a:spcBef>
+              <a:buFont typeface="Arial" pitchFamily="34" charset="0"/>
+              <a:buChar char="•"/>
+              <a:defRPr sz="2000" kern="1200">
+                <a:solidFill>
+                  <a:schemeClr val="tx1"/>
+                </a:solidFill>
+                <a:latin typeface="+mn-lt"/>
+                <a:ea typeface="+mn-ea"/>
+                <a:cs typeface="+mn-cs"/>
+              </a:defRPr>
+            </a:lvl8pPr>
+            <a:lvl9pPr marL="3886200" indent="-228600" algn="l" defTabSz="914400" rtl="0" eaLnBrk="1" latinLnBrk="0" hangingPunct="1">
+              <a:spcBef>
+                <a:spcPct val="20000"/>
+              </a:spcBef>
+              <a:buFont typeface="Arial" pitchFamily="34" charset="0"/>
+              <a:buChar char="•"/>
+              <a:defRPr sz="2000" kern="1200">
+                <a:solidFill>
+                  <a:schemeClr val="tx1"/>
+                </a:solidFill>
+                <a:latin typeface="+mn-lt"/>
+                <a:ea typeface="+mn-ea"/>
+                <a:cs typeface="+mn-cs"/>
+              </a:defRPr>
+            </a:lvl9pPr>
+          </a:lstStyle>
+          <a:p>
+            <a:pPr defTabSz="342900">
+              <a:lnSpc>
+                <a:spcPts val="1050"/>
+              </a:lnSpc>
+              <a:defRPr/>
+            </a:pPr>
+            <a:r>
+              <a:rPr lang="en-US" sz="1200" dirty="0">
+                <a:solidFill>
+                  <a:srgbClr val="FEFFFE"/>
+                </a:solidFill>
+                <a:latin typeface="Segoe UI Variable Text" pitchFamily="2" charset="0"/>
+              </a:rPr>
+              <a:t>Missed a talk? Watch all </a:t>
+            </a:r>
+            <a:r>
+              <a:rPr lang="en-US" sz="1200" dirty="0" err="1">
+                <a:solidFill>
+                  <a:srgbClr val="FEFFFE"/>
+                </a:solidFill>
+                <a:latin typeface="Segoe UI Variable Text" pitchFamily="2" charset="0"/>
+              </a:rPr>
+              <a:t>VSLive</a:t>
+            </a:r>
+            <a:r>
+              <a:rPr lang="en-US" sz="1200" dirty="0">
+                <a:solidFill>
+                  <a:srgbClr val="FEFFFE"/>
+                </a:solidFill>
+                <a:latin typeface="Segoe UI Variable Text" pitchFamily="2" charset="0"/>
+              </a:rPr>
+              <a:t> videos on demand after the event.</a:t>
+            </a:r>
+          </a:p>
+        </p:txBody>
+      </p:sp>
+      <p:pic>
+        <p:nvPicPr>
+          <p:cNvPr id="34" name="Image 16" descr=" ">
+            <a:extLst>
+              <a:ext uri="{FF2B5EF4-FFF2-40B4-BE49-F238E27FC236}">
+                <a16:creationId xmlns:a16="http://schemas.microsoft.com/office/drawing/2014/main" id="{3B1770F7-63C5-E153-235E-908FD44FD5BC}"/>
+              </a:ext>
+            </a:extLst>
+          </p:cNvPr>
+          <p:cNvPicPr>
+            <a:picLocks noChangeAspect="1"/>
+          </p:cNvPicPr>
+          <p:nvPr/>
+        </p:nvPicPr>
+        <p:blipFill>
+          <a:blip r:embed="rId3">
+            <a:extLst>
+              <a:ext uri="{96DAC541-7B7A-43D3-8B79-37D633B846F1}">
+                <asvg:svgBlip xmlns:asvg="http://schemas.microsoft.com/office/drawing/2016/SVG/main" r:embed="rId4"/>
+              </a:ext>
+            </a:extLst>
+          </a:blip>
+          <a:stretch>
+            <a:fillRect/>
+          </a:stretch>
+        </p:blipFill>
+        <p:spPr>
+          <a:xfrm>
+            <a:off x="5009030" y="1970136"/>
+            <a:ext cx="230468" cy="243190"/>
+          </a:xfrm>
+          <a:prstGeom prst="rect">
+            <a:avLst/>
+          </a:prstGeom>
+        </p:spPr>
+      </p:pic>
+    </p:spTree>
+    <p:extLst>
+      <p:ext uri="{BB962C8B-B14F-4D97-AF65-F5344CB8AC3E}">
+        <p14:creationId xmlns:p14="http://schemas.microsoft.com/office/powerpoint/2010/main" val="2906568194"/>
+      </p:ext>
+    </p:extLst>
+  </p:cSld>
+  <p:clrMapOvr>
+    <a:masterClrMapping/>
+  </p:clrMapOvr>
+</p:sld>
+</file>
+
+<file path=ppt/slides/slide17.xml><?xml version="1.0" encoding="utf-8"?>
 <p:sld xmlns:a="http://schemas.openxmlformats.org/drawingml/2006/main" xmlns:r="http://schemas.openxmlformats.org/officeDocument/2006/relationships" xmlns:p="http://schemas.openxmlformats.org/presentationml/2006/main">
   <p:cSld>
     <p:bg>
@@ -9752,4 +11469,10 @@
   <a:objectDefaults/>
   <a:extraClrSchemeLst/>
 </a:theme>
+</file>
+
+<file path=docMetadata/LabelInfo.xml><?xml version="1.0" encoding="utf-8"?>
+<clbl:labelList xmlns:clbl="http://schemas.microsoft.com/office/2020/mipLabelMetadata">
+  <clbl:label id="{f42aa342-8706-4288-bd11-ebb85995028c}" enabled="1" method="Standard" siteId="{72f988bf-86f1-41af-91ab-2d7cd011db47}" contentBits="0" removed="0"/>
+</clbl:labelList>
 </file>
</xml_diff>